<commit_message>
ppt (annexes) + article v2.01
</commit_message>
<xml_diff>
--- a/presentation/projet_ml.pptx
+++ b/presentation/projet_ml.pptx
@@ -5,7 +5,7 @@
     <p:sldMasterId id="2147483648" r:id="rId1"/>
   </p:sldMasterIdLst>
   <p:notesMasterIdLst>
-    <p:notesMasterId r:id="rId15"/>
+    <p:notesMasterId r:id="rId21"/>
   </p:notesMasterIdLst>
   <p:sldIdLst>
     <p:sldId id="256" r:id="rId2"/>
@@ -21,24 +21,30 @@
     <p:sldId id="274" r:id="rId12"/>
     <p:sldId id="267" r:id="rId13"/>
     <p:sldId id="268" r:id="rId14"/>
+    <p:sldId id="275" r:id="rId15"/>
+    <p:sldId id="276" r:id="rId16"/>
+    <p:sldId id="277" r:id="rId17"/>
+    <p:sldId id="278" r:id="rId18"/>
+    <p:sldId id="279" r:id="rId19"/>
+    <p:sldId id="280" r:id="rId20"/>
   </p:sldIdLst>
   <p:sldSz cx="18288000" cy="10287000"/>
   <p:notesSz cx="6858000" cy="9144000"/>
   <p:embeddedFontLst>
     <p:embeddedFont>
       <p:font typeface="Calibri" panose="020F0502020204030204" pitchFamily="34" charset="0"/>
-      <p:regular r:id="rId16"/>
-      <p:bold r:id="rId17"/>
-      <p:italic r:id="rId18"/>
-      <p:boldItalic r:id="rId19"/>
+      <p:regular r:id="rId22"/>
+      <p:bold r:id="rId23"/>
+      <p:italic r:id="rId24"/>
+      <p:boldItalic r:id="rId25"/>
     </p:embeddedFont>
     <p:embeddedFont>
       <p:font typeface="Roboto" panose="02010600030101010101" charset="0"/>
-      <p:regular r:id="rId20"/>
+      <p:regular r:id="rId26"/>
     </p:embeddedFont>
     <p:embeddedFont>
       <p:font typeface="Roboto Bold" panose="02010600030101010101" charset="0"/>
-      <p:regular r:id="rId21"/>
+      <p:regular r:id="rId27"/>
     </p:embeddedFont>
   </p:embeddedFontLst>
   <p:defaultTextStyle>
@@ -237,7 +243,7 @@
           <a:p>
             <a:fld id="{46D798D7-D38D-41B0-928D-09487A51FCF7}" type="datetimeFigureOut">
               <a:rPr lang="en-US" smtClean="0"/>
-              <a:t>1/20/2020</a:t>
+              <a:t>1/26/2020</a:t>
             </a:fld>
             <a:endParaRPr lang="en-US"/>
           </a:p>
@@ -588,6 +594,90 @@
 </p:notes>
 </file>
 
+<file path=ppt/notesSlides/notesSlide2.xml><?xml version="1.0" encoding="utf-8"?>
+<p:notes xmlns:a="http://schemas.openxmlformats.org/drawingml/2006/main" xmlns:r="http://schemas.openxmlformats.org/officeDocument/2006/relationships" xmlns:p="http://schemas.openxmlformats.org/presentationml/2006/main">
+  <p:cSld>
+    <p:spTree>
+      <p:nvGrpSpPr>
+        <p:cNvPr id="1" name=""/>
+        <p:cNvGrpSpPr/>
+        <p:nvPr/>
+      </p:nvGrpSpPr>
+      <p:grpSpPr>
+        <a:xfrm>
+          <a:off x="0" y="0"/>
+          <a:ext cx="0" cy="0"/>
+          <a:chOff x="0" y="0"/>
+          <a:chExt cx="0" cy="0"/>
+        </a:xfrm>
+      </p:grpSpPr>
+      <p:sp>
+        <p:nvSpPr>
+          <p:cNvPr id="2" name="Slide Image Placeholder 1"/>
+          <p:cNvSpPr>
+            <a:spLocks noGrp="1" noRot="1" noChangeAspect="1"/>
+          </p:cNvSpPr>
+          <p:nvPr>
+            <p:ph type="sldImg"/>
+          </p:nvPr>
+        </p:nvSpPr>
+        <p:spPr/>
+      </p:sp>
+      <p:sp>
+        <p:nvSpPr>
+          <p:cNvPr id="3" name="Notes Placeholder 2"/>
+          <p:cNvSpPr>
+            <a:spLocks noGrp="1"/>
+          </p:cNvSpPr>
+          <p:nvPr>
+            <p:ph type="body" idx="1"/>
+          </p:nvPr>
+        </p:nvSpPr>
+        <p:spPr/>
+        <p:txBody>
+          <a:bodyPr/>
+          <a:lstStyle/>
+          <a:p>
+            <a:endParaRPr lang="en-US" dirty="0"/>
+          </a:p>
+        </p:txBody>
+      </p:sp>
+      <p:sp>
+        <p:nvSpPr>
+          <p:cNvPr id="4" name="Slide Number Placeholder 3"/>
+          <p:cNvSpPr>
+            <a:spLocks noGrp="1"/>
+          </p:cNvSpPr>
+          <p:nvPr>
+            <p:ph type="sldNum" sz="quarter" idx="5"/>
+          </p:nvPr>
+        </p:nvSpPr>
+        <p:spPr/>
+        <p:txBody>
+          <a:bodyPr/>
+          <a:lstStyle/>
+          <a:p>
+            <a:fld id="{77B77E47-C069-4555-B238-4836D79404D1}" type="slidenum">
+              <a:rPr lang="en-US" smtClean="0"/>
+              <a:t>19</a:t>
+            </a:fld>
+            <a:endParaRPr lang="en-US"/>
+          </a:p>
+        </p:txBody>
+      </p:sp>
+    </p:spTree>
+    <p:extLst>
+      <p:ext uri="{BB962C8B-B14F-4D97-AF65-F5344CB8AC3E}">
+        <p14:creationId xmlns:p14="http://schemas.microsoft.com/office/powerpoint/2010/main" val="663768835"/>
+      </p:ext>
+    </p:extLst>
+  </p:cSld>
+  <p:clrMapOvr>
+    <a:masterClrMapping/>
+  </p:clrMapOvr>
+</p:notes>
+</file>
+
 <file path=ppt/slideLayouts/slideLayout1.xml><?xml version="1.0" encoding="utf-8"?>
 <p:sldLayout xmlns:a="http://schemas.openxmlformats.org/drawingml/2006/main" xmlns:r="http://schemas.openxmlformats.org/officeDocument/2006/relationships" xmlns:p="http://schemas.openxmlformats.org/presentationml/2006/main" type="title" preserve="1">
   <p:cSld name="Title Slide">
@@ -768,7 +858,7 @@
             <a:fld id="{1D8BD707-D9CF-40AE-B4C6-C98DA3205C09}" type="datetimeFigureOut">
               <a:rPr lang="en-US" smtClean="0"/>
               <a:pPr/>
-              <a:t>1/20/2020</a:t>
+              <a:t>1/26/2020</a:t>
             </a:fld>
             <a:endParaRPr lang="en-US"/>
           </a:p>
@@ -933,7 +1023,7 @@
             <a:fld id="{1D8BD707-D9CF-40AE-B4C6-C98DA3205C09}" type="datetimeFigureOut">
               <a:rPr lang="en-US" smtClean="0"/>
               <a:pPr/>
-              <a:t>1/20/2020</a:t>
+              <a:t>1/26/2020</a:t>
             </a:fld>
             <a:endParaRPr lang="en-US"/>
           </a:p>
@@ -1108,7 +1198,7 @@
             <a:fld id="{1D8BD707-D9CF-40AE-B4C6-C98DA3205C09}" type="datetimeFigureOut">
               <a:rPr lang="en-US" smtClean="0"/>
               <a:pPr/>
-              <a:t>1/20/2020</a:t>
+              <a:t>1/26/2020</a:t>
             </a:fld>
             <a:endParaRPr lang="en-US"/>
           </a:p>
@@ -1273,7 +1363,7 @@
             <a:fld id="{1D8BD707-D9CF-40AE-B4C6-C98DA3205C09}" type="datetimeFigureOut">
               <a:rPr lang="en-US" smtClean="0"/>
               <a:pPr/>
-              <a:t>1/20/2020</a:t>
+              <a:t>1/26/2020</a:t>
             </a:fld>
             <a:endParaRPr lang="en-US"/>
           </a:p>
@@ -1515,7 +1605,7 @@
             <a:fld id="{1D8BD707-D9CF-40AE-B4C6-C98DA3205C09}" type="datetimeFigureOut">
               <a:rPr lang="en-US" smtClean="0"/>
               <a:pPr/>
-              <a:t>1/20/2020</a:t>
+              <a:t>1/26/2020</a:t>
             </a:fld>
             <a:endParaRPr lang="en-US"/>
           </a:p>
@@ -1797,7 +1887,7 @@
             <a:fld id="{1D8BD707-D9CF-40AE-B4C6-C98DA3205C09}" type="datetimeFigureOut">
               <a:rPr lang="en-US" smtClean="0"/>
               <a:pPr/>
-              <a:t>1/20/2020</a:t>
+              <a:t>1/26/2020</a:t>
             </a:fld>
             <a:endParaRPr lang="en-US"/>
           </a:p>
@@ -2213,7 +2303,7 @@
             <a:fld id="{1D8BD707-D9CF-40AE-B4C6-C98DA3205C09}" type="datetimeFigureOut">
               <a:rPr lang="en-US" smtClean="0"/>
               <a:pPr/>
-              <a:t>1/20/2020</a:t>
+              <a:t>1/26/2020</a:t>
             </a:fld>
             <a:endParaRPr lang="en-US"/>
           </a:p>
@@ -2327,7 +2417,7 @@
             <a:fld id="{1D8BD707-D9CF-40AE-B4C6-C98DA3205C09}" type="datetimeFigureOut">
               <a:rPr lang="en-US" smtClean="0"/>
               <a:pPr/>
-              <a:t>1/20/2020</a:t>
+              <a:t>1/26/2020</a:t>
             </a:fld>
             <a:endParaRPr lang="en-US"/>
           </a:p>
@@ -2419,7 +2509,7 @@
             <a:fld id="{1D8BD707-D9CF-40AE-B4C6-C98DA3205C09}" type="datetimeFigureOut">
               <a:rPr lang="en-US" smtClean="0"/>
               <a:pPr/>
-              <a:t>1/20/2020</a:t>
+              <a:t>1/26/2020</a:t>
             </a:fld>
             <a:endParaRPr lang="en-US"/>
           </a:p>
@@ -2691,7 +2781,7 @@
             <a:fld id="{1D8BD707-D9CF-40AE-B4C6-C98DA3205C09}" type="datetimeFigureOut">
               <a:rPr lang="en-US" smtClean="0"/>
               <a:pPr/>
-              <a:t>1/20/2020</a:t>
+              <a:t>1/26/2020</a:t>
             </a:fld>
             <a:endParaRPr lang="en-US"/>
           </a:p>
@@ -2940,7 +3030,7 @@
             <a:fld id="{1D8BD707-D9CF-40AE-B4C6-C98DA3205C09}" type="datetimeFigureOut">
               <a:rPr lang="en-US" smtClean="0"/>
               <a:pPr/>
-              <a:t>1/20/2020</a:t>
+              <a:t>1/26/2020</a:t>
             </a:fld>
             <a:endParaRPr lang="en-US"/>
           </a:p>
@@ -3151,7 +3241,7 @@
             <a:fld id="{1D8BD707-D9CF-40AE-B4C6-C98DA3205C09}" type="datetimeFigureOut">
               <a:rPr lang="en-US" smtClean="0"/>
               <a:pPr/>
-              <a:t>1/20/2020</a:t>
+              <a:t>1/26/2020</a:t>
             </a:fld>
             <a:endParaRPr lang="en-US"/>
           </a:p>
@@ -4207,16 +4297,18 @@
                 <a:lnSpc>
                   <a:spcPts val="3640"/>
                 </a:lnSpc>
-                <a:buFont typeface="Arial" panose="020B0604020202020204" pitchFamily="34" charset="0"/>
-                <a:buChar char="•"/>
+                <a:buClr>
+                  <a:srgbClr val="00B050"/>
+                </a:buClr>
+                <a:buFont typeface="Wingdings" panose="05000000000000000000" pitchFamily="2" charset="2"/>
+                <a:buChar char="ü"/>
               </a:pPr>
               <a:r>
                 <a:rPr lang="fr-FR" sz="2600" dirty="0">
                   <a:solidFill>
                     <a:srgbClr val="251E20"/>
                   </a:solidFill>
-                  <a:latin typeface="Roboto" panose="02010600030101010101" charset="0"/>
-                  <a:ea typeface="Roboto" panose="02010600030101010101" charset="0"/>
+                  <a:latin typeface="Roboto"/>
                 </a:rPr>
                 <a:t>Avantages du </a:t>
               </a:r>
@@ -4225,8 +4317,7 @@
                   <a:solidFill>
                     <a:srgbClr val="251E20"/>
                   </a:solidFill>
-                  <a:latin typeface="Roboto" panose="02010600030101010101" charset="0"/>
-                  <a:ea typeface="Roboto" panose="02010600030101010101" charset="0"/>
+                  <a:latin typeface="Roboto"/>
                 </a:rPr>
                 <a:t>XGboost</a:t>
               </a:r>
@@ -4235,8 +4326,7 @@
                   <a:solidFill>
                     <a:srgbClr val="251E20"/>
                   </a:solidFill>
-                  <a:latin typeface="Roboto" panose="02010600030101010101" charset="0"/>
-                  <a:ea typeface="Roboto" panose="02010600030101010101" charset="0"/>
+                  <a:latin typeface="Roboto"/>
                 </a:rPr>
                 <a:t> </a:t>
               </a:r>
@@ -4246,57 +4336,57 @@
                 <a:lnSpc>
                   <a:spcPts val="3640"/>
                 </a:lnSpc>
-                <a:buFont typeface="Arial" panose="020B0604020202020204" pitchFamily="34" charset="0"/>
-                <a:buChar char="•"/>
+                <a:buClr>
+                  <a:srgbClr val="00B050"/>
+                </a:buClr>
+                <a:buFont typeface="Wingdings" panose="05000000000000000000" pitchFamily="2" charset="2"/>
+                <a:buChar char="ü"/>
               </a:pPr>
               <a:r>
                 <a:rPr lang="fr-FR" sz="2600" dirty="0">
-                  <a:latin typeface="Roboto" panose="02010600030101010101" charset="0"/>
-                  <a:ea typeface="Roboto" panose="02010600030101010101" charset="0"/>
-                  <a:cs typeface="+mn-lt"/>
+                  <a:solidFill>
+                    <a:srgbClr val="251E20"/>
+                  </a:solidFill>
+                  <a:latin typeface="Roboto"/>
                 </a:rPr>
                 <a:t>Très efficace et rapide (50x plus rapide que </a:t>
               </a:r>
               <a:r>
                 <a:rPr lang="fr-FR" sz="2600" dirty="0" err="1">
-                  <a:latin typeface="Roboto" panose="02010600030101010101" charset="0"/>
-                  <a:ea typeface="Roboto" panose="02010600030101010101" charset="0"/>
-                  <a:cs typeface="+mn-lt"/>
+                  <a:solidFill>
+                    <a:srgbClr val="251E20"/>
+                  </a:solidFill>
+                  <a:latin typeface="Roboto"/>
                 </a:rPr>
                 <a:t>XGboost</a:t>
               </a:r>
               <a:r>
                 <a:rPr lang="fr-FR" sz="2600" dirty="0">
-                  <a:latin typeface="Roboto" panose="02010600030101010101" charset="0"/>
-                  <a:ea typeface="Roboto" panose="02010600030101010101" charset="0"/>
-                  <a:cs typeface="+mn-lt"/>
+                  <a:solidFill>
+                    <a:srgbClr val="251E20"/>
+                  </a:solidFill>
+                  <a:latin typeface="Roboto"/>
                 </a:rPr>
                 <a:t>)</a:t>
               </a:r>
-              <a:endParaRPr lang="fr-FR" sz="2600" dirty="0">
-                <a:solidFill>
-                  <a:srgbClr val="251E20"/>
-                </a:solidFill>
-                <a:latin typeface="Roboto" panose="02010600030101010101" charset="0"/>
-                <a:ea typeface="Roboto" panose="02010600030101010101" charset="0"/>
-              </a:endParaRPr>
             </a:p>
             <a:p>
               <a:pPr marL="1371600" lvl="2" indent="-457200">
                 <a:lnSpc>
                   <a:spcPts val="3640"/>
                 </a:lnSpc>
-                <a:buFont typeface="Arial" panose="020B0604020202020204" pitchFamily="34" charset="0"/>
-                <a:buChar char="•"/>
+                <a:buClr>
+                  <a:srgbClr val="00B050"/>
+                </a:buClr>
+                <a:buFont typeface="Wingdings" panose="05000000000000000000" pitchFamily="2" charset="2"/>
+                <a:buChar char="ü"/>
               </a:pPr>
               <a:r>
                 <a:rPr lang="fr-FR" sz="2600" dirty="0">
                   <a:solidFill>
                     <a:srgbClr val="251E20"/>
                   </a:solidFill>
-                  <a:latin typeface="Roboto" panose="02010600030101010101" charset="0"/>
-                  <a:ea typeface="Roboto" panose="02010600030101010101" charset="0"/>
-                  <a:cs typeface="Calibri"/>
+                  <a:latin typeface="Roboto"/>
                 </a:rPr>
                 <a:t>Mécanisme de sélection de variable et échantillonnage intégré</a:t>
               </a:r>
@@ -4306,17 +4396,18 @@
                 <a:lnSpc>
                   <a:spcPts val="3640"/>
                 </a:lnSpc>
-                <a:buFont typeface="Arial" panose="020B0604020202020204" pitchFamily="34" charset="0"/>
-                <a:buChar char="•"/>
+                <a:buClr>
+                  <a:srgbClr val="00B050"/>
+                </a:buClr>
+                <a:buFont typeface="Wingdings" panose="05000000000000000000" pitchFamily="2" charset="2"/>
+                <a:buChar char="ü"/>
               </a:pPr>
               <a:r>
                 <a:rPr lang="fr-FR" sz="2600" dirty="0">
                   <a:solidFill>
                     <a:srgbClr val="251E20"/>
                   </a:solidFill>
-                  <a:latin typeface="Roboto" panose="02010600030101010101" charset="0"/>
-                  <a:ea typeface="Roboto" panose="02010600030101010101" charset="0"/>
-                  <a:cs typeface="Calibri"/>
+                  <a:latin typeface="Roboto"/>
                 </a:rPr>
                 <a:t>Justification théorique de certains résultats</a:t>
               </a:r>
@@ -4487,7 +4578,7 @@
                 </a:rPr>
                 <a:t>Inconvénients </a:t>
               </a:r>
-              <a:endParaRPr lang="fr-FR">
+              <a:endParaRPr lang="fr-FR" dirty="0">
                 <a:cs typeface="Calibri"/>
               </a:endParaRPr>
             </a:p>
@@ -4524,8 +4615,12 @@
                 <a:lnSpc>
                   <a:spcPts val="3640"/>
                 </a:lnSpc>
-                <a:buFont typeface="Arial"/>
-                <a:buChar char="•"/>
+                <a:buClr>
+                  <a:srgbClr val="FF0000"/>
+                </a:buClr>
+                <a:buSzPct val="125000"/>
+                <a:buFont typeface="Roboto" panose="02010600030101010101" charset="0"/>
+                <a:buChar char="×"/>
               </a:pPr>
               <a:r>
                 <a:rPr lang="fr-FR" sz="2600" dirty="0">
@@ -4549,8 +4644,12 @@
                 <a:lnSpc>
                   <a:spcPts val="3640"/>
                 </a:lnSpc>
-                <a:buFont typeface="Arial" panose="020B0604020202020204" pitchFamily="34" charset="0"/>
-                <a:buChar char="•"/>
+                <a:buClr>
+                  <a:srgbClr val="FF0000"/>
+                </a:buClr>
+                <a:buSzPct val="125000"/>
+                <a:buFont typeface="Roboto" panose="02010600030101010101" charset="0"/>
+                <a:buChar char="×"/>
               </a:pPr>
               <a:r>
                 <a:rPr lang="fr-FR" sz="2600" dirty="0">
@@ -4901,17 +5000,18 @@
                 <a:lnSpc>
                   <a:spcPts val="3640"/>
                 </a:lnSpc>
-                <a:buFont typeface="Arial" panose="020B0604020202020204" pitchFamily="34" charset="0"/>
-                <a:buChar char="•"/>
+                <a:buClr>
+                  <a:srgbClr val="00B050"/>
+                </a:buClr>
+                <a:buFont typeface="Wingdings" panose="05000000000000000000" pitchFamily="2" charset="2"/>
+                <a:buChar char="ü"/>
               </a:pPr>
               <a:r>
                 <a:rPr lang="fr-FR" sz="2600" dirty="0">
                   <a:solidFill>
-                    <a:srgbClr val="000000"/>
+                    <a:srgbClr val="251E20"/>
                   </a:solidFill>
-                  <a:latin typeface="Roboto" panose="02010600030101010101" charset="0"/>
-                  <a:ea typeface="Roboto" panose="02010600030101010101" charset="0"/>
-                  <a:cs typeface="Calibri"/>
+                  <a:latin typeface="Roboto"/>
                 </a:rPr>
                 <a:t>Permet d'améliorer les prédictions en cas d'informations complémentaires</a:t>
               </a:r>
@@ -4921,17 +5021,18 @@
                 <a:lnSpc>
                   <a:spcPts val="3640"/>
                 </a:lnSpc>
-                <a:buFont typeface="Arial" panose="020B0604020202020204" pitchFamily="34" charset="0"/>
-                <a:buChar char="•"/>
+                <a:buClr>
+                  <a:srgbClr val="00B050"/>
+                </a:buClr>
+                <a:buFont typeface="Wingdings" panose="05000000000000000000" pitchFamily="2" charset="2"/>
+                <a:buChar char="ü"/>
               </a:pPr>
               <a:r>
                 <a:rPr lang="fr-FR" sz="2600" dirty="0">
                   <a:solidFill>
-                    <a:srgbClr val="000000"/>
+                    <a:srgbClr val="251E20"/>
                   </a:solidFill>
-                  <a:latin typeface="Roboto" panose="02010600030101010101" charset="0"/>
-                  <a:ea typeface="Roboto" panose="02010600030101010101" charset="0"/>
-                  <a:cs typeface="Calibri"/>
+                  <a:latin typeface="Roboto"/>
                 </a:rPr>
                 <a:t>Rapidement implémentable à partir des prédictions faites des modèles à agréger</a:t>
               </a:r>
@@ -5121,8 +5222,12 @@
                 <a:lnSpc>
                   <a:spcPts val="3640"/>
                 </a:lnSpc>
-                <a:buFont typeface="Arial"/>
-                <a:buChar char="•"/>
+                <a:buClr>
+                  <a:srgbClr val="FF0000"/>
+                </a:buClr>
+                <a:buSzPct val="125000"/>
+                <a:buFont typeface="Roboto" panose="02010600030101010101" charset="0"/>
+                <a:buChar char="×"/>
               </a:pPr>
               <a:r>
                 <a:rPr lang="fr-FR" sz="2600" dirty="0">
@@ -5146,8 +5251,12 @@
                 <a:lnSpc>
                   <a:spcPts val="3640"/>
                 </a:lnSpc>
-                <a:buFont typeface="Arial" panose="020B0604020202020204" pitchFamily="34" charset="0"/>
-                <a:buChar char="•"/>
+                <a:buClr>
+                  <a:srgbClr val="FF0000"/>
+                </a:buClr>
+                <a:buSzPct val="125000"/>
+                <a:buFont typeface="Roboto" panose="02010600030101010101" charset="0"/>
+                <a:buChar char="×"/>
               </a:pPr>
               <a:r>
                 <a:rPr lang="fr-FR" sz="2600" dirty="0">
@@ -5680,7 +5789,7 @@
           <p:nvPr>
             <p:extLst>
               <p:ext uri="{D42A27DB-BD31-4B8C-83A1-F6EECF244321}">
-                <p14:modId xmlns:p14="http://schemas.microsoft.com/office/powerpoint/2010/main" val="2583187364"/>
+                <p14:modId xmlns:p14="http://schemas.microsoft.com/office/powerpoint/2010/main" val="3142836116"/>
               </p:ext>
             </p:extLst>
           </p:nvPr>
@@ -6286,7 +6395,7 @@
                   </a:txBody>
                   <a:tcPr>
                     <a:solidFill>
-                      <a:srgbClr val="FFC000"/>
+                      <a:srgbClr val="00B050"/>
                     </a:solidFill>
                   </a:tcPr>
                 </a:tc>
@@ -6545,7 +6654,7 @@
                   </a:txBody>
                   <a:tcPr>
                     <a:solidFill>
-                      <a:srgbClr val="00B050"/>
+                      <a:srgbClr val="FFC000"/>
                     </a:solidFill>
                   </a:tcPr>
                 </a:tc>
@@ -9473,6 +9582,4017 @@
 </p:sld>
 </file>
 
+<file path=ppt/slides/slide14.xml><?xml version="1.0" encoding="utf-8"?>
+<p:sld xmlns:a="http://schemas.openxmlformats.org/drawingml/2006/main" xmlns:r="http://schemas.openxmlformats.org/officeDocument/2006/relationships" xmlns:p="http://schemas.openxmlformats.org/presentationml/2006/main">
+  <p:cSld>
+    <p:spTree>
+      <p:nvGrpSpPr>
+        <p:cNvPr id="1" name=""/>
+        <p:cNvGrpSpPr/>
+        <p:nvPr/>
+      </p:nvGrpSpPr>
+      <p:grpSpPr>
+        <a:xfrm>
+          <a:off x="0" y="0"/>
+          <a:ext cx="0" cy="0"/>
+          <a:chOff x="0" y="0"/>
+          <a:chExt cx="0" cy="0"/>
+        </a:xfrm>
+      </p:grpSpPr>
+      <p:grpSp>
+        <p:nvGrpSpPr>
+          <p:cNvPr id="2" name="Group 2"/>
+          <p:cNvGrpSpPr/>
+          <p:nvPr/>
+        </p:nvGrpSpPr>
+        <p:grpSpPr>
+          <a:xfrm>
+            <a:off x="8179777" y="1104900"/>
+            <a:ext cx="8940979" cy="7094125"/>
+            <a:chOff x="0" y="0"/>
+            <a:chExt cx="7338332" cy="5822522"/>
+          </a:xfrm>
+        </p:grpSpPr>
+        <p:sp>
+          <p:nvSpPr>
+            <p:cNvPr id="3" name="Freeform 3"/>
+            <p:cNvSpPr/>
+            <p:nvPr/>
+          </p:nvSpPr>
+          <p:spPr>
+            <a:xfrm>
+              <a:off x="0" y="0"/>
+              <a:ext cx="7338332" cy="5822522"/>
+            </a:xfrm>
+            <a:custGeom>
+              <a:avLst/>
+              <a:gdLst/>
+              <a:ahLst/>
+              <a:cxnLst/>
+              <a:rect l="l" t="t" r="r" b="b"/>
+              <a:pathLst>
+                <a:path w="7338332" h="5822522">
+                  <a:moveTo>
+                    <a:pt x="0" y="0"/>
+                  </a:moveTo>
+                  <a:lnTo>
+                    <a:pt x="0" y="5822522"/>
+                  </a:lnTo>
+                  <a:lnTo>
+                    <a:pt x="7338332" y="5822522"/>
+                  </a:lnTo>
+                  <a:lnTo>
+                    <a:pt x="7338332" y="0"/>
+                  </a:lnTo>
+                  <a:lnTo>
+                    <a:pt x="0" y="0"/>
+                  </a:lnTo>
+                  <a:close/>
+                  <a:moveTo>
+                    <a:pt x="7277372" y="5761562"/>
+                  </a:moveTo>
+                  <a:lnTo>
+                    <a:pt x="59690" y="5761562"/>
+                  </a:lnTo>
+                  <a:lnTo>
+                    <a:pt x="59690" y="59690"/>
+                  </a:lnTo>
+                  <a:lnTo>
+                    <a:pt x="7277372" y="59690"/>
+                  </a:lnTo>
+                  <a:lnTo>
+                    <a:pt x="7277372" y="5761562"/>
+                  </a:lnTo>
+                  <a:close/>
+                </a:path>
+              </a:pathLst>
+            </a:custGeom>
+            <a:solidFill>
+              <a:srgbClr val="251E20"/>
+            </a:solidFill>
+          </p:spPr>
+        </p:sp>
+      </p:grpSp>
+      <p:sp>
+        <p:nvSpPr>
+          <p:cNvPr id="4" name="TextBox 4"/>
+          <p:cNvSpPr txBox="1"/>
+          <p:nvPr/>
+        </p:nvSpPr>
+        <p:spPr>
+          <a:xfrm rot="-5400000">
+            <a:off x="-1651671" y="6006112"/>
+            <a:ext cx="5595057" cy="487299"/>
+          </a:xfrm>
+          <a:prstGeom prst="rect">
+            <a:avLst/>
+          </a:prstGeom>
+        </p:spPr>
+        <p:txBody>
+          <a:bodyPr lIns="0" tIns="0" rIns="0" bIns="0" rtlCol="0" anchor="t">
+            <a:spAutoFit/>
+          </a:bodyPr>
+          <a:lstStyle/>
+          <a:p>
+            <a:pPr>
+              <a:lnSpc>
+                <a:spcPts val="3647"/>
+              </a:lnSpc>
+            </a:pPr>
+            <a:r>
+              <a:rPr lang="en-US" sz="3200" spc="192">
+                <a:solidFill>
+                  <a:srgbClr val="251E20"/>
+                </a:solidFill>
+                <a:latin typeface="Roboto Bold"/>
+              </a:rPr>
+              <a:t>MACHINE LEARNING</a:t>
+            </a:r>
+          </a:p>
+        </p:txBody>
+      </p:sp>
+      <p:sp>
+        <p:nvSpPr>
+          <p:cNvPr id="5" name="TextBox 5"/>
+          <p:cNvSpPr txBox="1"/>
+          <p:nvPr/>
+        </p:nvSpPr>
+        <p:spPr>
+          <a:xfrm>
+            <a:off x="9110538" y="2346405"/>
+            <a:ext cx="7079458" cy="1202189"/>
+          </a:xfrm>
+          <a:prstGeom prst="rect">
+            <a:avLst/>
+          </a:prstGeom>
+        </p:spPr>
+        <p:txBody>
+          <a:bodyPr lIns="0" tIns="0" rIns="0" bIns="0" rtlCol="0" anchor="t">
+            <a:spAutoFit/>
+          </a:bodyPr>
+          <a:lstStyle/>
+          <a:p>
+            <a:pPr>
+              <a:lnSpc>
+                <a:spcPts val="9312"/>
+              </a:lnSpc>
+            </a:pPr>
+            <a:r>
+              <a:rPr lang="en-US" sz="9600" spc="-96" dirty="0">
+                <a:solidFill>
+                  <a:srgbClr val="251E20"/>
+                </a:solidFill>
+                <a:latin typeface="Roboto Bold"/>
+              </a:rPr>
+              <a:t>Annexes</a:t>
+            </a:r>
+          </a:p>
+        </p:txBody>
+      </p:sp>
+      <p:sp>
+        <p:nvSpPr>
+          <p:cNvPr id="6" name="TextBox 6"/>
+          <p:cNvSpPr txBox="1"/>
+          <p:nvPr/>
+        </p:nvSpPr>
+        <p:spPr>
+          <a:xfrm>
+            <a:off x="7959381" y="8717217"/>
+            <a:ext cx="9135588" cy="541083"/>
+          </a:xfrm>
+          <a:prstGeom prst="rect">
+            <a:avLst/>
+          </a:prstGeom>
+        </p:spPr>
+        <p:txBody>
+          <a:bodyPr lIns="0" tIns="0" rIns="0" bIns="0" rtlCol="0" anchor="t">
+            <a:spAutoFit/>
+          </a:bodyPr>
+          <a:lstStyle/>
+          <a:p>
+            <a:pPr algn="r">
+              <a:lnSpc>
+                <a:spcPts val="4312"/>
+              </a:lnSpc>
+            </a:pPr>
+            <a:r>
+              <a:rPr lang="en-US" sz="2800" spc="140">
+                <a:solidFill>
+                  <a:srgbClr val="251E20"/>
+                </a:solidFill>
+                <a:latin typeface="Roboto"/>
+              </a:rPr>
+              <a:t>Guy Tsang, Axel Gardahaut &amp; Léo Dutertre-Ladurée</a:t>
+            </a:r>
+          </a:p>
+        </p:txBody>
+      </p:sp>
+      <p:sp>
+        <p:nvSpPr>
+          <p:cNvPr id="7" name="AutoShape 7"/>
+          <p:cNvSpPr/>
+          <p:nvPr/>
+        </p:nvSpPr>
+        <p:spPr>
+          <a:xfrm>
+            <a:off x="1028700" y="-1600200"/>
+            <a:ext cx="228600" cy="4419600"/>
+          </a:xfrm>
+          <a:prstGeom prst="rect">
+            <a:avLst/>
+          </a:prstGeom>
+          <a:solidFill>
+            <a:srgbClr val="251E20"/>
+          </a:solidFill>
+        </p:spPr>
+      </p:sp>
+      <p:sp>
+        <p:nvSpPr>
+          <p:cNvPr id="8" name="AutoShape 8"/>
+          <p:cNvSpPr/>
+          <p:nvPr/>
+        </p:nvSpPr>
+        <p:spPr>
+          <a:xfrm>
+            <a:off x="17094969" y="6249761"/>
+            <a:ext cx="1574031" cy="1278235"/>
+          </a:xfrm>
+          <a:prstGeom prst="rect">
+            <a:avLst/>
+          </a:prstGeom>
+          <a:solidFill>
+            <a:srgbClr val="251E20"/>
+          </a:solidFill>
+        </p:spPr>
+      </p:sp>
+      <p:pic>
+        <p:nvPicPr>
+          <p:cNvPr id="9" name="Picture 9"/>
+          <p:cNvPicPr>
+            <a:picLocks noChangeAspect="1"/>
+          </p:cNvPicPr>
+          <p:nvPr/>
+        </p:nvPicPr>
+        <p:blipFill>
+          <a:blip r:embed="rId2"/>
+          <a:srcRect l="34246" r="34246"/>
+          <a:stretch>
+            <a:fillRect/>
+          </a:stretch>
+        </p:blipFill>
+        <p:spPr>
+          <a:xfrm>
+            <a:off x="2172124" y="-304800"/>
+            <a:ext cx="5143500" cy="10896600"/>
+          </a:xfrm>
+          <a:prstGeom prst="rect">
+            <a:avLst/>
+          </a:prstGeom>
+        </p:spPr>
+      </p:pic>
+      <p:sp>
+        <p:nvSpPr>
+          <p:cNvPr id="10" name="AutoShape 10"/>
+          <p:cNvSpPr/>
+          <p:nvPr/>
+        </p:nvSpPr>
+        <p:spPr>
+          <a:xfrm>
+            <a:off x="17712550" y="4187551"/>
+            <a:ext cx="41785" cy="760681"/>
+          </a:xfrm>
+          <a:prstGeom prst="rect">
+            <a:avLst/>
+          </a:prstGeom>
+          <a:solidFill>
+            <a:srgbClr val="251E20"/>
+          </a:solidFill>
+        </p:spPr>
+      </p:sp>
+      <p:sp>
+        <p:nvSpPr>
+          <p:cNvPr id="11" name="AutoShape 11"/>
+          <p:cNvSpPr/>
+          <p:nvPr/>
+        </p:nvSpPr>
+        <p:spPr>
+          <a:xfrm>
+            <a:off x="17712550" y="2740928"/>
+            <a:ext cx="41785" cy="760681"/>
+          </a:xfrm>
+          <a:prstGeom prst="rect">
+            <a:avLst/>
+          </a:prstGeom>
+          <a:solidFill>
+            <a:srgbClr val="251E20"/>
+          </a:solidFill>
+        </p:spPr>
+      </p:sp>
+    </p:spTree>
+    <p:extLst>
+      <p:ext uri="{BB962C8B-B14F-4D97-AF65-F5344CB8AC3E}">
+        <p14:creationId xmlns:p14="http://schemas.microsoft.com/office/powerpoint/2010/main" val="4161092458"/>
+      </p:ext>
+    </p:extLst>
+  </p:cSld>
+  <p:clrMapOvr>
+    <a:masterClrMapping/>
+  </p:clrMapOvr>
+</p:sld>
+</file>
+
+<file path=ppt/slides/slide15.xml><?xml version="1.0" encoding="utf-8"?>
+<p:sld xmlns:a="http://schemas.openxmlformats.org/drawingml/2006/main" xmlns:r="http://schemas.openxmlformats.org/officeDocument/2006/relationships" xmlns:p="http://schemas.openxmlformats.org/presentationml/2006/main">
+  <p:cSld>
+    <p:spTree>
+      <p:nvGrpSpPr>
+        <p:cNvPr id="1" name=""/>
+        <p:cNvGrpSpPr/>
+        <p:nvPr/>
+      </p:nvGrpSpPr>
+      <p:grpSpPr>
+        <a:xfrm>
+          <a:off x="0" y="0"/>
+          <a:ext cx="0" cy="0"/>
+          <a:chOff x="0" y="0"/>
+          <a:chExt cx="0" cy="0"/>
+        </a:xfrm>
+      </p:grpSpPr>
+      <p:sp>
+        <p:nvSpPr>
+          <p:cNvPr id="2" name="TextBox 2"/>
+          <p:cNvSpPr txBox="1"/>
+          <p:nvPr/>
+        </p:nvSpPr>
+        <p:spPr>
+          <a:xfrm>
+            <a:off x="2209800" y="690572"/>
+            <a:ext cx="13187156" cy="961802"/>
+          </a:xfrm>
+          <a:prstGeom prst="rect">
+            <a:avLst/>
+          </a:prstGeom>
+        </p:spPr>
+        <p:txBody>
+          <a:bodyPr lIns="0" tIns="0" rIns="0" bIns="0" rtlCol="0" anchor="t">
+            <a:spAutoFit/>
+          </a:bodyPr>
+          <a:lstStyle/>
+          <a:p>
+            <a:pPr>
+              <a:lnSpc>
+                <a:spcPts val="7952"/>
+              </a:lnSpc>
+            </a:pPr>
+            <a:r>
+              <a:rPr lang="fr-FR" sz="5600" spc="168" dirty="0">
+                <a:solidFill>
+                  <a:srgbClr val="251E20"/>
+                </a:solidFill>
+                <a:latin typeface="Roboto Bold"/>
+              </a:rPr>
+              <a:t>ANNEXES (1/5)</a:t>
+            </a:r>
+          </a:p>
+        </p:txBody>
+      </p:sp>
+      <p:grpSp>
+        <p:nvGrpSpPr>
+          <p:cNvPr id="3" name="Group 3"/>
+          <p:cNvGrpSpPr/>
+          <p:nvPr/>
+        </p:nvGrpSpPr>
+        <p:grpSpPr>
+          <a:xfrm>
+            <a:off x="1028699" y="3444459"/>
+            <a:ext cx="14093315" cy="3492341"/>
+            <a:chOff x="0" y="-76200"/>
+            <a:chExt cx="9125299" cy="4656456"/>
+          </a:xfrm>
+        </p:grpSpPr>
+        <p:sp>
+          <p:nvSpPr>
+            <p:cNvPr id="4" name="TextBox 4"/>
+            <p:cNvSpPr txBox="1"/>
+            <p:nvPr/>
+          </p:nvSpPr>
+          <p:spPr>
+            <a:xfrm>
+              <a:off x="0" y="-76200"/>
+              <a:ext cx="9125299" cy="666849"/>
+            </a:xfrm>
+            <a:prstGeom prst="rect">
+              <a:avLst/>
+            </a:prstGeom>
+          </p:spPr>
+          <p:txBody>
+            <a:bodyPr lIns="0" tIns="0" rIns="0" bIns="0" rtlCol="0" anchor="t">
+              <a:spAutoFit/>
+            </a:bodyPr>
+            <a:lstStyle/>
+            <a:p>
+              <a:pPr marL="495300" lvl="1" indent="-247650">
+                <a:lnSpc>
+                  <a:spcPts val="4200"/>
+                </a:lnSpc>
+                <a:buFont typeface="Arial"/>
+                <a:buChar char="•"/>
+              </a:pPr>
+              <a:r>
+                <a:rPr lang="fr-FR" sz="3000" spc="359" dirty="0">
+                  <a:solidFill>
+                    <a:srgbClr val="251E20"/>
+                  </a:solidFill>
+                  <a:latin typeface="Roboto"/>
+                </a:rPr>
+                <a:t>Hyperparamètres</a:t>
+              </a:r>
+            </a:p>
+          </p:txBody>
+        </p:sp>
+        <p:sp>
+          <p:nvSpPr>
+            <p:cNvPr id="5" name="TextBox 5"/>
+            <p:cNvSpPr txBox="1"/>
+            <p:nvPr/>
+          </p:nvSpPr>
+          <p:spPr>
+            <a:xfrm>
+              <a:off x="0" y="929683"/>
+              <a:ext cx="9125299" cy="3650573"/>
+            </a:xfrm>
+            <a:prstGeom prst="rect">
+              <a:avLst/>
+            </a:prstGeom>
+          </p:spPr>
+          <p:txBody>
+            <a:bodyPr lIns="0" tIns="0" rIns="0" bIns="0" rtlCol="0" anchor="t">
+              <a:spAutoFit/>
+            </a:bodyPr>
+            <a:lstStyle/>
+            <a:p>
+              <a:pPr marL="1371600" lvl="2" indent="-457200">
+                <a:lnSpc>
+                  <a:spcPts val="3640"/>
+                </a:lnSpc>
+                <a:buFont typeface="Arial" panose="020B0604020202020204" pitchFamily="34" charset="0"/>
+                <a:buChar char="•"/>
+              </a:pPr>
+              <a:r>
+                <a:rPr lang="fr-FR" sz="2600" dirty="0">
+                  <a:solidFill>
+                    <a:srgbClr val="251E20"/>
+                  </a:solidFill>
+                  <a:latin typeface="Roboto"/>
+                </a:rPr>
+                <a:t>Taux d’apprentissage : 0.01</a:t>
+              </a:r>
+            </a:p>
+            <a:p>
+              <a:pPr marL="1371600" lvl="2" indent="-457200">
+                <a:lnSpc>
+                  <a:spcPts val="3640"/>
+                </a:lnSpc>
+                <a:buFont typeface="Arial" panose="020B0604020202020204" pitchFamily="34" charset="0"/>
+                <a:buChar char="•"/>
+              </a:pPr>
+              <a:r>
+                <a:rPr lang="fr-FR" sz="2600" dirty="0">
+                  <a:solidFill>
+                    <a:srgbClr val="251E20"/>
+                  </a:solidFill>
+                  <a:latin typeface="Roboto"/>
+                </a:rPr>
+                <a:t>Profondeur maximale d’un arbre : 10</a:t>
+              </a:r>
+            </a:p>
+            <a:p>
+              <a:pPr marL="1371600" lvl="2" indent="-457200">
+                <a:lnSpc>
+                  <a:spcPts val="3640"/>
+                </a:lnSpc>
+                <a:buFont typeface="Arial" panose="020B0604020202020204" pitchFamily="34" charset="0"/>
+                <a:buChar char="•"/>
+              </a:pPr>
+              <a:r>
+                <a:rPr lang="fr-FR" sz="2600" dirty="0">
+                  <a:solidFill>
+                    <a:srgbClr val="251E20"/>
+                  </a:solidFill>
+                  <a:latin typeface="Roboto"/>
+                </a:rPr>
+                <a:t>Nombre maximal de feuilles par arbre : 20</a:t>
+              </a:r>
+            </a:p>
+            <a:p>
+              <a:pPr marL="1371600" lvl="2" indent="-457200">
+                <a:lnSpc>
+                  <a:spcPts val="3640"/>
+                </a:lnSpc>
+                <a:buFont typeface="Arial" panose="020B0604020202020204" pitchFamily="34" charset="0"/>
+                <a:buChar char="•"/>
+              </a:pPr>
+              <a:r>
+                <a:rPr lang="fr-FR" sz="2600" dirty="0">
+                  <a:solidFill>
+                    <a:srgbClr val="251E20"/>
+                  </a:solidFill>
+                  <a:latin typeface="Roboto"/>
+                </a:rPr>
+                <a:t>Nombre minimal d’observations dans une feuille : 10</a:t>
+              </a:r>
+            </a:p>
+            <a:p>
+              <a:pPr marL="1371600" lvl="2" indent="-457200">
+                <a:lnSpc>
+                  <a:spcPts val="3640"/>
+                </a:lnSpc>
+                <a:buFont typeface="Arial" panose="020B0604020202020204" pitchFamily="34" charset="0"/>
+                <a:buChar char="•"/>
+              </a:pPr>
+              <a:r>
+                <a:rPr lang="fr-FR" sz="2600" dirty="0">
+                  <a:solidFill>
+                    <a:srgbClr val="251E20"/>
+                  </a:solidFill>
+                  <a:latin typeface="Roboto"/>
+                </a:rPr>
+                <a:t>Part de variables à utiliser par itération : 0.8</a:t>
+              </a:r>
+            </a:p>
+            <a:p>
+              <a:pPr marL="1371600" lvl="2" indent="-457200">
+                <a:lnSpc>
+                  <a:spcPts val="3640"/>
+                </a:lnSpc>
+                <a:buFont typeface="Arial" panose="020B0604020202020204" pitchFamily="34" charset="0"/>
+                <a:buChar char="•"/>
+              </a:pPr>
+              <a:r>
+                <a:rPr lang="fr-FR" sz="2600" dirty="0">
+                  <a:solidFill>
+                    <a:srgbClr val="251E20"/>
+                  </a:solidFill>
+                  <a:latin typeface="Roboto"/>
+                </a:rPr>
+                <a:t>Bagging sur les observations : 0.8</a:t>
+              </a:r>
+            </a:p>
+          </p:txBody>
+        </p:sp>
+      </p:grpSp>
+      <p:sp>
+        <p:nvSpPr>
+          <p:cNvPr id="6" name="AutoShape 6"/>
+          <p:cNvSpPr/>
+          <p:nvPr/>
+        </p:nvSpPr>
+        <p:spPr>
+          <a:xfrm>
+            <a:off x="17712550" y="4187551"/>
+            <a:ext cx="41785" cy="760681"/>
+          </a:xfrm>
+          <a:prstGeom prst="rect">
+            <a:avLst/>
+          </a:prstGeom>
+          <a:solidFill>
+            <a:srgbClr val="251E20"/>
+          </a:solidFill>
+        </p:spPr>
+      </p:sp>
+      <p:sp>
+        <p:nvSpPr>
+          <p:cNvPr id="7" name="AutoShape 7"/>
+          <p:cNvSpPr/>
+          <p:nvPr/>
+        </p:nvSpPr>
+        <p:spPr>
+          <a:xfrm>
+            <a:off x="17712550" y="2740928"/>
+            <a:ext cx="41785" cy="760681"/>
+          </a:xfrm>
+          <a:prstGeom prst="rect">
+            <a:avLst/>
+          </a:prstGeom>
+          <a:solidFill>
+            <a:srgbClr val="251E20"/>
+          </a:solidFill>
+        </p:spPr>
+      </p:sp>
+      <p:sp>
+        <p:nvSpPr>
+          <p:cNvPr id="8" name="TextBox 8"/>
+          <p:cNvSpPr txBox="1"/>
+          <p:nvPr/>
+        </p:nvSpPr>
+        <p:spPr>
+          <a:xfrm>
+            <a:off x="17390840" y="1047750"/>
+            <a:ext cx="513755" cy="415290"/>
+          </a:xfrm>
+          <a:prstGeom prst="rect">
+            <a:avLst/>
+          </a:prstGeom>
+        </p:spPr>
+        <p:txBody>
+          <a:bodyPr lIns="0" tIns="0" rIns="0" bIns="0" rtlCol="0" anchor="t">
+            <a:spAutoFit/>
+          </a:bodyPr>
+          <a:lstStyle/>
+          <a:p>
+            <a:pPr algn="r">
+              <a:lnSpc>
+                <a:spcPts val="3359"/>
+              </a:lnSpc>
+              <a:spcBef>
+                <a:spcPct val="0"/>
+              </a:spcBef>
+            </a:pPr>
+            <a:r>
+              <a:rPr lang="fr-FR" sz="2400" dirty="0">
+                <a:solidFill>
+                  <a:srgbClr val="251E20"/>
+                </a:solidFill>
+                <a:latin typeface="Roboto"/>
+              </a:rPr>
+              <a:t>I</a:t>
+            </a:r>
+          </a:p>
+        </p:txBody>
+      </p:sp>
+      <p:sp>
+        <p:nvSpPr>
+          <p:cNvPr id="9" name="AutoShape 9"/>
+          <p:cNvSpPr/>
+          <p:nvPr/>
+        </p:nvSpPr>
+        <p:spPr>
+          <a:xfrm>
+            <a:off x="17533417" y="8191500"/>
+            <a:ext cx="228600" cy="4191000"/>
+          </a:xfrm>
+          <a:prstGeom prst="rect">
+            <a:avLst/>
+          </a:prstGeom>
+          <a:solidFill>
+            <a:srgbClr val="251E20"/>
+          </a:solidFill>
+        </p:spPr>
+      </p:sp>
+      <p:sp>
+        <p:nvSpPr>
+          <p:cNvPr id="19" name="AutoShape 19"/>
+          <p:cNvSpPr/>
+          <p:nvPr/>
+        </p:nvSpPr>
+        <p:spPr>
+          <a:xfrm>
+            <a:off x="-1066800" y="823922"/>
+            <a:ext cx="2095500" cy="1278235"/>
+          </a:xfrm>
+          <a:prstGeom prst="rect">
+            <a:avLst/>
+          </a:prstGeom>
+          <a:solidFill>
+            <a:srgbClr val="251E20"/>
+          </a:solidFill>
+        </p:spPr>
+      </p:sp>
+      <p:sp>
+        <p:nvSpPr>
+          <p:cNvPr id="20" name="TextBox 20"/>
+          <p:cNvSpPr txBox="1"/>
+          <p:nvPr/>
+        </p:nvSpPr>
+        <p:spPr>
+          <a:xfrm>
+            <a:off x="2209800" y="1528784"/>
+            <a:ext cx="13187156" cy="535403"/>
+          </a:xfrm>
+          <a:prstGeom prst="rect">
+            <a:avLst/>
+          </a:prstGeom>
+        </p:spPr>
+        <p:txBody>
+          <a:bodyPr lIns="0" tIns="0" rIns="0" bIns="0" rtlCol="0" anchor="t">
+            <a:spAutoFit/>
+          </a:bodyPr>
+          <a:lstStyle/>
+          <a:p>
+            <a:pPr>
+              <a:lnSpc>
+                <a:spcPts val="4544"/>
+              </a:lnSpc>
+            </a:pPr>
+            <a:r>
+              <a:rPr lang="fr-FR" sz="3200" spc="96" dirty="0">
+                <a:solidFill>
+                  <a:srgbClr val="251E20"/>
+                </a:solidFill>
+                <a:latin typeface="Roboto Bold"/>
+              </a:rPr>
+              <a:t>HYPERPARAMETRES DU LGBM DE BENCHMARK</a:t>
+            </a:r>
+          </a:p>
+        </p:txBody>
+      </p:sp>
+    </p:spTree>
+    <p:extLst>
+      <p:ext uri="{BB962C8B-B14F-4D97-AF65-F5344CB8AC3E}">
+        <p14:creationId xmlns:p14="http://schemas.microsoft.com/office/powerpoint/2010/main" val="404666412"/>
+      </p:ext>
+    </p:extLst>
+  </p:cSld>
+  <p:clrMapOvr>
+    <a:masterClrMapping/>
+  </p:clrMapOvr>
+</p:sld>
+</file>
+
+<file path=ppt/slides/slide16.xml><?xml version="1.0" encoding="utf-8"?>
+<p:sld xmlns:a="http://schemas.openxmlformats.org/drawingml/2006/main" xmlns:r="http://schemas.openxmlformats.org/officeDocument/2006/relationships" xmlns:p="http://schemas.openxmlformats.org/presentationml/2006/main">
+  <p:cSld>
+    <p:spTree>
+      <p:nvGrpSpPr>
+        <p:cNvPr id="1" name=""/>
+        <p:cNvGrpSpPr/>
+        <p:nvPr/>
+      </p:nvGrpSpPr>
+      <p:grpSpPr>
+        <a:xfrm>
+          <a:off x="0" y="0"/>
+          <a:ext cx="0" cy="0"/>
+          <a:chOff x="0" y="0"/>
+          <a:chExt cx="0" cy="0"/>
+        </a:xfrm>
+      </p:grpSpPr>
+      <p:sp>
+        <p:nvSpPr>
+          <p:cNvPr id="2" name="TextBox 2"/>
+          <p:cNvSpPr txBox="1"/>
+          <p:nvPr/>
+        </p:nvSpPr>
+        <p:spPr>
+          <a:xfrm>
+            <a:off x="2209800" y="690572"/>
+            <a:ext cx="13187156" cy="961802"/>
+          </a:xfrm>
+          <a:prstGeom prst="rect">
+            <a:avLst/>
+          </a:prstGeom>
+        </p:spPr>
+        <p:txBody>
+          <a:bodyPr lIns="0" tIns="0" rIns="0" bIns="0" rtlCol="0" anchor="t">
+            <a:spAutoFit/>
+          </a:bodyPr>
+          <a:lstStyle/>
+          <a:p>
+            <a:pPr>
+              <a:lnSpc>
+                <a:spcPts val="7952"/>
+              </a:lnSpc>
+            </a:pPr>
+            <a:r>
+              <a:rPr lang="fr-FR" sz="5600" spc="168" dirty="0">
+                <a:solidFill>
+                  <a:srgbClr val="251E20"/>
+                </a:solidFill>
+                <a:latin typeface="Roboto Bold"/>
+              </a:rPr>
+              <a:t>ANNEXES (2/5)</a:t>
+            </a:r>
+          </a:p>
+        </p:txBody>
+      </p:sp>
+      <p:sp>
+        <p:nvSpPr>
+          <p:cNvPr id="6" name="AutoShape 6"/>
+          <p:cNvSpPr/>
+          <p:nvPr/>
+        </p:nvSpPr>
+        <p:spPr>
+          <a:xfrm>
+            <a:off x="17712550" y="4187551"/>
+            <a:ext cx="41785" cy="760681"/>
+          </a:xfrm>
+          <a:prstGeom prst="rect">
+            <a:avLst/>
+          </a:prstGeom>
+          <a:solidFill>
+            <a:srgbClr val="251E20"/>
+          </a:solidFill>
+        </p:spPr>
+      </p:sp>
+      <p:sp>
+        <p:nvSpPr>
+          <p:cNvPr id="7" name="AutoShape 7"/>
+          <p:cNvSpPr/>
+          <p:nvPr/>
+        </p:nvSpPr>
+        <p:spPr>
+          <a:xfrm>
+            <a:off x="17712550" y="2740928"/>
+            <a:ext cx="41785" cy="760681"/>
+          </a:xfrm>
+          <a:prstGeom prst="rect">
+            <a:avLst/>
+          </a:prstGeom>
+          <a:solidFill>
+            <a:srgbClr val="251E20"/>
+          </a:solidFill>
+        </p:spPr>
+      </p:sp>
+      <p:sp>
+        <p:nvSpPr>
+          <p:cNvPr id="8" name="TextBox 8"/>
+          <p:cNvSpPr txBox="1"/>
+          <p:nvPr/>
+        </p:nvSpPr>
+        <p:spPr>
+          <a:xfrm>
+            <a:off x="17390840" y="1047750"/>
+            <a:ext cx="513755" cy="415290"/>
+          </a:xfrm>
+          <a:prstGeom prst="rect">
+            <a:avLst/>
+          </a:prstGeom>
+        </p:spPr>
+        <p:txBody>
+          <a:bodyPr lIns="0" tIns="0" rIns="0" bIns="0" rtlCol="0" anchor="t">
+            <a:spAutoFit/>
+          </a:bodyPr>
+          <a:lstStyle/>
+          <a:p>
+            <a:pPr algn="r">
+              <a:lnSpc>
+                <a:spcPts val="3359"/>
+              </a:lnSpc>
+              <a:spcBef>
+                <a:spcPct val="0"/>
+              </a:spcBef>
+            </a:pPr>
+            <a:r>
+              <a:rPr lang="fr-FR" sz="2400" dirty="0">
+                <a:solidFill>
+                  <a:srgbClr val="251E20"/>
+                </a:solidFill>
+                <a:latin typeface="Roboto"/>
+              </a:rPr>
+              <a:t>II</a:t>
+            </a:r>
+          </a:p>
+        </p:txBody>
+      </p:sp>
+      <p:sp>
+        <p:nvSpPr>
+          <p:cNvPr id="9" name="AutoShape 9"/>
+          <p:cNvSpPr/>
+          <p:nvPr/>
+        </p:nvSpPr>
+        <p:spPr>
+          <a:xfrm>
+            <a:off x="17533417" y="8191500"/>
+            <a:ext cx="228600" cy="4191000"/>
+          </a:xfrm>
+          <a:prstGeom prst="rect">
+            <a:avLst/>
+          </a:prstGeom>
+          <a:solidFill>
+            <a:srgbClr val="251E20"/>
+          </a:solidFill>
+        </p:spPr>
+      </p:sp>
+      <p:sp>
+        <p:nvSpPr>
+          <p:cNvPr id="19" name="AutoShape 19"/>
+          <p:cNvSpPr/>
+          <p:nvPr/>
+        </p:nvSpPr>
+        <p:spPr>
+          <a:xfrm>
+            <a:off x="-1066800" y="823922"/>
+            <a:ext cx="2095500" cy="1278235"/>
+          </a:xfrm>
+          <a:prstGeom prst="rect">
+            <a:avLst/>
+          </a:prstGeom>
+          <a:solidFill>
+            <a:srgbClr val="251E20"/>
+          </a:solidFill>
+        </p:spPr>
+      </p:sp>
+      <p:sp>
+        <p:nvSpPr>
+          <p:cNvPr id="20" name="TextBox 20"/>
+          <p:cNvSpPr txBox="1"/>
+          <p:nvPr/>
+        </p:nvSpPr>
+        <p:spPr>
+          <a:xfrm>
+            <a:off x="2209800" y="1528784"/>
+            <a:ext cx="13187156" cy="535403"/>
+          </a:xfrm>
+          <a:prstGeom prst="rect">
+            <a:avLst/>
+          </a:prstGeom>
+        </p:spPr>
+        <p:txBody>
+          <a:bodyPr lIns="0" tIns="0" rIns="0" bIns="0" rtlCol="0" anchor="t">
+            <a:spAutoFit/>
+          </a:bodyPr>
+          <a:lstStyle/>
+          <a:p>
+            <a:pPr>
+              <a:lnSpc>
+                <a:spcPts val="4544"/>
+              </a:lnSpc>
+            </a:pPr>
+            <a:r>
+              <a:rPr lang="fr-FR" sz="3200" spc="96" dirty="0">
+                <a:solidFill>
+                  <a:srgbClr val="251E20"/>
+                </a:solidFill>
+                <a:latin typeface="Roboto Bold"/>
+              </a:rPr>
+              <a:t>STRATEGIE DE FUSION PAR AFDM</a:t>
+            </a:r>
+          </a:p>
+        </p:txBody>
+      </p:sp>
+      <p:pic>
+        <p:nvPicPr>
+          <p:cNvPr id="11" name="Picture 10">
+            <a:extLst>
+              <a:ext uri="{FF2B5EF4-FFF2-40B4-BE49-F238E27FC236}">
+                <a16:creationId xmlns:a16="http://schemas.microsoft.com/office/drawing/2014/main" id="{9EA0FF87-01D8-4DF2-84B0-16E0CACF0A7A}"/>
+              </a:ext>
+            </a:extLst>
+          </p:cNvPr>
+          <p:cNvPicPr>
+            <a:picLocks noChangeAspect="1"/>
+          </p:cNvPicPr>
+          <p:nvPr/>
+        </p:nvPicPr>
+        <p:blipFill>
+          <a:blip r:embed="rId2">
+            <a:extLst>
+              <a:ext uri="{28A0092B-C50C-407E-A947-70E740481C1C}">
+                <a14:useLocalDpi xmlns:a14="http://schemas.microsoft.com/office/drawing/2010/main" val="0"/>
+              </a:ext>
+            </a:extLst>
+          </a:blip>
+          <a:stretch>
+            <a:fillRect/>
+          </a:stretch>
+        </p:blipFill>
+        <p:spPr>
+          <a:xfrm>
+            <a:off x="2590800" y="2494050"/>
+            <a:ext cx="11582400" cy="7239000"/>
+          </a:xfrm>
+          <a:prstGeom prst="rect">
+            <a:avLst/>
+          </a:prstGeom>
+        </p:spPr>
+      </p:pic>
+      <p:sp>
+        <p:nvSpPr>
+          <p:cNvPr id="13" name="Oval 12">
+            <a:extLst>
+              <a:ext uri="{FF2B5EF4-FFF2-40B4-BE49-F238E27FC236}">
+                <a16:creationId xmlns:a16="http://schemas.microsoft.com/office/drawing/2014/main" id="{1387D256-F87E-4CF9-8018-9587C2927C49}"/>
+              </a:ext>
+            </a:extLst>
+          </p:cNvPr>
+          <p:cNvSpPr/>
+          <p:nvPr/>
+        </p:nvSpPr>
+        <p:spPr>
+          <a:xfrm>
+            <a:off x="4495800" y="4838700"/>
+            <a:ext cx="1143000" cy="961802"/>
+          </a:xfrm>
+          <a:prstGeom prst="ellipse">
+            <a:avLst/>
+          </a:prstGeom>
+          <a:noFill/>
+          <a:ln>
+            <a:solidFill>
+              <a:srgbClr val="FF0000"/>
+            </a:solidFill>
+          </a:ln>
+        </p:spPr>
+        <p:style>
+          <a:lnRef idx="2">
+            <a:schemeClr val="accent1">
+              <a:shade val="50000"/>
+            </a:schemeClr>
+          </a:lnRef>
+          <a:fillRef idx="1">
+            <a:schemeClr val="accent1"/>
+          </a:fillRef>
+          <a:effectRef idx="0">
+            <a:schemeClr val="accent1"/>
+          </a:effectRef>
+          <a:fontRef idx="minor">
+            <a:schemeClr val="lt1"/>
+          </a:fontRef>
+        </p:style>
+        <p:txBody>
+          <a:bodyPr rtlCol="0" anchor="ctr"/>
+          <a:lstStyle/>
+          <a:p>
+            <a:pPr algn="ctr"/>
+            <a:endParaRPr lang="en-US"/>
+          </a:p>
+        </p:txBody>
+      </p:sp>
+      <p:sp>
+        <p:nvSpPr>
+          <p:cNvPr id="16" name="Oval 15">
+            <a:extLst>
+              <a:ext uri="{FF2B5EF4-FFF2-40B4-BE49-F238E27FC236}">
+                <a16:creationId xmlns:a16="http://schemas.microsoft.com/office/drawing/2014/main" id="{D7EF9662-12CC-4C7F-9A3D-513E4624CB66}"/>
+              </a:ext>
+            </a:extLst>
+          </p:cNvPr>
+          <p:cNvSpPr/>
+          <p:nvPr/>
+        </p:nvSpPr>
+        <p:spPr>
+          <a:xfrm rot="19158671">
+            <a:off x="5421879" y="3585219"/>
+            <a:ext cx="3665499" cy="1973561"/>
+          </a:xfrm>
+          <a:prstGeom prst="ellipse">
+            <a:avLst/>
+          </a:prstGeom>
+          <a:noFill/>
+          <a:ln>
+            <a:solidFill>
+              <a:srgbClr val="FF0000"/>
+            </a:solidFill>
+          </a:ln>
+        </p:spPr>
+        <p:style>
+          <a:lnRef idx="2">
+            <a:schemeClr val="accent1">
+              <a:shade val="50000"/>
+            </a:schemeClr>
+          </a:lnRef>
+          <a:fillRef idx="1">
+            <a:schemeClr val="accent1"/>
+          </a:fillRef>
+          <a:effectRef idx="0">
+            <a:schemeClr val="accent1"/>
+          </a:effectRef>
+          <a:fontRef idx="minor">
+            <a:schemeClr val="lt1"/>
+          </a:fontRef>
+        </p:style>
+        <p:txBody>
+          <a:bodyPr rtlCol="0" anchor="ctr"/>
+          <a:lstStyle/>
+          <a:p>
+            <a:pPr algn="ctr"/>
+            <a:endParaRPr lang="en-US"/>
+          </a:p>
+        </p:txBody>
+      </p:sp>
+      <p:sp>
+        <p:nvSpPr>
+          <p:cNvPr id="17" name="Oval 16">
+            <a:extLst>
+              <a:ext uri="{FF2B5EF4-FFF2-40B4-BE49-F238E27FC236}">
+                <a16:creationId xmlns:a16="http://schemas.microsoft.com/office/drawing/2014/main" id="{3D193A7E-4577-477D-BC15-3DE329F7C450}"/>
+              </a:ext>
+            </a:extLst>
+          </p:cNvPr>
+          <p:cNvSpPr/>
+          <p:nvPr/>
+        </p:nvSpPr>
+        <p:spPr>
+          <a:xfrm rot="354688">
+            <a:off x="8195459" y="4719162"/>
+            <a:ext cx="3006733" cy="1339867"/>
+          </a:xfrm>
+          <a:prstGeom prst="ellipse">
+            <a:avLst/>
+          </a:prstGeom>
+          <a:noFill/>
+          <a:ln>
+            <a:solidFill>
+              <a:srgbClr val="FF0000"/>
+            </a:solidFill>
+          </a:ln>
+        </p:spPr>
+        <p:style>
+          <a:lnRef idx="2">
+            <a:schemeClr val="accent1">
+              <a:shade val="50000"/>
+            </a:schemeClr>
+          </a:lnRef>
+          <a:fillRef idx="1">
+            <a:schemeClr val="accent1"/>
+          </a:fillRef>
+          <a:effectRef idx="0">
+            <a:schemeClr val="accent1"/>
+          </a:effectRef>
+          <a:fontRef idx="minor">
+            <a:schemeClr val="lt1"/>
+          </a:fontRef>
+        </p:style>
+        <p:txBody>
+          <a:bodyPr rtlCol="0" anchor="ctr"/>
+          <a:lstStyle/>
+          <a:p>
+            <a:pPr algn="ctr"/>
+            <a:endParaRPr lang="en-US"/>
+          </a:p>
+        </p:txBody>
+      </p:sp>
+      <p:sp>
+        <p:nvSpPr>
+          <p:cNvPr id="15" name="Oval 14">
+            <a:extLst>
+              <a:ext uri="{FF2B5EF4-FFF2-40B4-BE49-F238E27FC236}">
+                <a16:creationId xmlns:a16="http://schemas.microsoft.com/office/drawing/2014/main" id="{920E419D-339C-4661-8B69-B8A9D263149D}"/>
+              </a:ext>
+            </a:extLst>
+          </p:cNvPr>
+          <p:cNvSpPr/>
+          <p:nvPr/>
+        </p:nvSpPr>
+        <p:spPr>
+          <a:xfrm rot="19728586">
+            <a:off x="8199336" y="5449374"/>
+            <a:ext cx="6381395" cy="3747776"/>
+          </a:xfrm>
+          <a:custGeom>
+            <a:avLst/>
+            <a:gdLst>
+              <a:gd name="connsiteX0" fmla="*/ 0 w 6379501"/>
+              <a:gd name="connsiteY0" fmla="*/ 2046859 h 4093718"/>
+              <a:gd name="connsiteX1" fmla="*/ 3189751 w 6379501"/>
+              <a:gd name="connsiteY1" fmla="*/ 0 h 4093718"/>
+              <a:gd name="connsiteX2" fmla="*/ 6379502 w 6379501"/>
+              <a:gd name="connsiteY2" fmla="*/ 2046859 h 4093718"/>
+              <a:gd name="connsiteX3" fmla="*/ 3189751 w 6379501"/>
+              <a:gd name="connsiteY3" fmla="*/ 4093718 h 4093718"/>
+              <a:gd name="connsiteX4" fmla="*/ 0 w 6379501"/>
+              <a:gd name="connsiteY4" fmla="*/ 2046859 h 4093718"/>
+              <a:gd name="connsiteX0" fmla="*/ 1893 w 6381395"/>
+              <a:gd name="connsiteY0" fmla="*/ 1340103 h 3386962"/>
+              <a:gd name="connsiteX1" fmla="*/ 2860955 w 6381395"/>
+              <a:gd name="connsiteY1" fmla="*/ 0 h 3386962"/>
+              <a:gd name="connsiteX2" fmla="*/ 6381395 w 6381395"/>
+              <a:gd name="connsiteY2" fmla="*/ 1340103 h 3386962"/>
+              <a:gd name="connsiteX3" fmla="*/ 3191644 w 6381395"/>
+              <a:gd name="connsiteY3" fmla="*/ 3386962 h 3386962"/>
+              <a:gd name="connsiteX4" fmla="*/ 1893 w 6381395"/>
+              <a:gd name="connsiteY4" fmla="*/ 1340103 h 3386962"/>
+            </a:gdLst>
+            <a:ahLst/>
+            <a:cxnLst>
+              <a:cxn ang="0">
+                <a:pos x="connsiteX0" y="connsiteY0"/>
+              </a:cxn>
+              <a:cxn ang="0">
+                <a:pos x="connsiteX1" y="connsiteY1"/>
+              </a:cxn>
+              <a:cxn ang="0">
+                <a:pos x="connsiteX2" y="connsiteY2"/>
+              </a:cxn>
+              <a:cxn ang="0">
+                <a:pos x="connsiteX3" y="connsiteY3"/>
+              </a:cxn>
+              <a:cxn ang="0">
+                <a:pos x="connsiteX4" y="connsiteY4"/>
+              </a:cxn>
+            </a:cxnLst>
+            <a:rect l="l" t="t" r="r" b="b"/>
+            <a:pathLst>
+              <a:path w="6381395" h="3386962">
+                <a:moveTo>
+                  <a:pt x="1893" y="1340103"/>
+                </a:moveTo>
+                <a:cubicBezTo>
+                  <a:pt x="-53222" y="775609"/>
+                  <a:pt x="1099304" y="0"/>
+                  <a:pt x="2860955" y="0"/>
+                </a:cubicBezTo>
+                <a:cubicBezTo>
+                  <a:pt x="4622606" y="0"/>
+                  <a:pt x="6381395" y="209654"/>
+                  <a:pt x="6381395" y="1340103"/>
+                </a:cubicBezTo>
+                <a:cubicBezTo>
+                  <a:pt x="6381395" y="2470552"/>
+                  <a:pt x="4953295" y="3386962"/>
+                  <a:pt x="3191644" y="3386962"/>
+                </a:cubicBezTo>
+                <a:cubicBezTo>
+                  <a:pt x="1429993" y="3386962"/>
+                  <a:pt x="57008" y="1904597"/>
+                  <a:pt x="1893" y="1340103"/>
+                </a:cubicBezTo>
+                <a:close/>
+              </a:path>
+            </a:pathLst>
+          </a:custGeom>
+          <a:noFill/>
+          <a:ln>
+            <a:solidFill>
+              <a:srgbClr val="FF0000"/>
+            </a:solidFill>
+          </a:ln>
+        </p:spPr>
+        <p:style>
+          <a:lnRef idx="2">
+            <a:schemeClr val="accent1">
+              <a:shade val="50000"/>
+            </a:schemeClr>
+          </a:lnRef>
+          <a:fillRef idx="1">
+            <a:schemeClr val="accent1"/>
+          </a:fillRef>
+          <a:effectRef idx="0">
+            <a:schemeClr val="accent1"/>
+          </a:effectRef>
+          <a:fontRef idx="minor">
+            <a:schemeClr val="lt1"/>
+          </a:fontRef>
+        </p:style>
+        <p:txBody>
+          <a:bodyPr rot="0" spcFirstLastPara="0" vertOverflow="overflow" horzOverflow="overflow" vert="horz" wrap="square" lIns="91440" tIns="45720" rIns="91440" bIns="45720" numCol="1" spcCol="0" rtlCol="0" fromWordArt="0" anchor="ctr" anchorCtr="0" forceAA="0" compatLnSpc="1">
+            <a:prstTxWarp prst="textNoShape">
+              <a:avLst/>
+            </a:prstTxWarp>
+            <a:noAutofit/>
+          </a:bodyPr>
+          <a:lstStyle/>
+          <a:p>
+            <a:pPr algn="ctr"/>
+            <a:endParaRPr lang="en-US"/>
+          </a:p>
+        </p:txBody>
+      </p:sp>
+    </p:spTree>
+    <p:extLst>
+      <p:ext uri="{BB962C8B-B14F-4D97-AF65-F5344CB8AC3E}">
+        <p14:creationId xmlns:p14="http://schemas.microsoft.com/office/powerpoint/2010/main" val="4065884373"/>
+      </p:ext>
+    </p:extLst>
+  </p:cSld>
+  <p:clrMapOvr>
+    <a:masterClrMapping/>
+  </p:clrMapOvr>
+</p:sld>
+</file>
+
+<file path=ppt/slides/slide17.xml><?xml version="1.0" encoding="utf-8"?>
+<p:sld xmlns:a="http://schemas.openxmlformats.org/drawingml/2006/main" xmlns:r="http://schemas.openxmlformats.org/officeDocument/2006/relationships" xmlns:p="http://schemas.openxmlformats.org/presentationml/2006/main">
+  <p:cSld>
+    <p:spTree>
+      <p:nvGrpSpPr>
+        <p:cNvPr id="1" name=""/>
+        <p:cNvGrpSpPr/>
+        <p:nvPr/>
+      </p:nvGrpSpPr>
+      <p:grpSpPr>
+        <a:xfrm>
+          <a:off x="0" y="0"/>
+          <a:ext cx="0" cy="0"/>
+          <a:chOff x="0" y="0"/>
+          <a:chExt cx="0" cy="0"/>
+        </a:xfrm>
+      </p:grpSpPr>
+      <p:sp>
+        <p:nvSpPr>
+          <p:cNvPr id="2" name="TextBox 2"/>
+          <p:cNvSpPr txBox="1"/>
+          <p:nvPr/>
+        </p:nvSpPr>
+        <p:spPr>
+          <a:xfrm>
+            <a:off x="2209800" y="690572"/>
+            <a:ext cx="13187156" cy="961802"/>
+          </a:xfrm>
+          <a:prstGeom prst="rect">
+            <a:avLst/>
+          </a:prstGeom>
+        </p:spPr>
+        <p:txBody>
+          <a:bodyPr lIns="0" tIns="0" rIns="0" bIns="0" rtlCol="0" anchor="t">
+            <a:spAutoFit/>
+          </a:bodyPr>
+          <a:lstStyle/>
+          <a:p>
+            <a:pPr>
+              <a:lnSpc>
+                <a:spcPts val="7952"/>
+              </a:lnSpc>
+            </a:pPr>
+            <a:r>
+              <a:rPr lang="fr-FR" sz="5600" spc="168" dirty="0">
+                <a:solidFill>
+                  <a:srgbClr val="251E20"/>
+                </a:solidFill>
+                <a:latin typeface="Roboto Bold"/>
+              </a:rPr>
+              <a:t>ANNEXES (3/5)</a:t>
+            </a:r>
+          </a:p>
+        </p:txBody>
+      </p:sp>
+      <p:sp>
+        <p:nvSpPr>
+          <p:cNvPr id="6" name="AutoShape 6"/>
+          <p:cNvSpPr/>
+          <p:nvPr/>
+        </p:nvSpPr>
+        <p:spPr>
+          <a:xfrm>
+            <a:off x="17712550" y="4187551"/>
+            <a:ext cx="41785" cy="760681"/>
+          </a:xfrm>
+          <a:prstGeom prst="rect">
+            <a:avLst/>
+          </a:prstGeom>
+          <a:solidFill>
+            <a:srgbClr val="251E20"/>
+          </a:solidFill>
+        </p:spPr>
+      </p:sp>
+      <p:sp>
+        <p:nvSpPr>
+          <p:cNvPr id="7" name="AutoShape 7"/>
+          <p:cNvSpPr/>
+          <p:nvPr/>
+        </p:nvSpPr>
+        <p:spPr>
+          <a:xfrm>
+            <a:off x="17712550" y="2740928"/>
+            <a:ext cx="41785" cy="760681"/>
+          </a:xfrm>
+          <a:prstGeom prst="rect">
+            <a:avLst/>
+          </a:prstGeom>
+          <a:solidFill>
+            <a:srgbClr val="251E20"/>
+          </a:solidFill>
+        </p:spPr>
+      </p:sp>
+      <p:sp>
+        <p:nvSpPr>
+          <p:cNvPr id="8" name="TextBox 8"/>
+          <p:cNvSpPr txBox="1"/>
+          <p:nvPr/>
+        </p:nvSpPr>
+        <p:spPr>
+          <a:xfrm>
+            <a:off x="17390840" y="1047750"/>
+            <a:ext cx="513755" cy="415290"/>
+          </a:xfrm>
+          <a:prstGeom prst="rect">
+            <a:avLst/>
+          </a:prstGeom>
+        </p:spPr>
+        <p:txBody>
+          <a:bodyPr lIns="0" tIns="0" rIns="0" bIns="0" rtlCol="0" anchor="t">
+            <a:spAutoFit/>
+          </a:bodyPr>
+          <a:lstStyle/>
+          <a:p>
+            <a:pPr algn="r">
+              <a:lnSpc>
+                <a:spcPts val="3359"/>
+              </a:lnSpc>
+              <a:spcBef>
+                <a:spcPct val="0"/>
+              </a:spcBef>
+            </a:pPr>
+            <a:r>
+              <a:rPr lang="fr-FR" sz="2400" dirty="0">
+                <a:solidFill>
+                  <a:srgbClr val="251E20"/>
+                </a:solidFill>
+                <a:latin typeface="Roboto"/>
+              </a:rPr>
+              <a:t>III</a:t>
+            </a:r>
+          </a:p>
+        </p:txBody>
+      </p:sp>
+      <p:sp>
+        <p:nvSpPr>
+          <p:cNvPr id="9" name="AutoShape 9"/>
+          <p:cNvSpPr/>
+          <p:nvPr/>
+        </p:nvSpPr>
+        <p:spPr>
+          <a:xfrm>
+            <a:off x="17533417" y="8191500"/>
+            <a:ext cx="228600" cy="4191000"/>
+          </a:xfrm>
+          <a:prstGeom prst="rect">
+            <a:avLst/>
+          </a:prstGeom>
+          <a:solidFill>
+            <a:srgbClr val="251E20"/>
+          </a:solidFill>
+        </p:spPr>
+      </p:sp>
+      <p:sp>
+        <p:nvSpPr>
+          <p:cNvPr id="19" name="AutoShape 19"/>
+          <p:cNvSpPr/>
+          <p:nvPr/>
+        </p:nvSpPr>
+        <p:spPr>
+          <a:xfrm>
+            <a:off x="-1066800" y="823922"/>
+            <a:ext cx="2095500" cy="1278235"/>
+          </a:xfrm>
+          <a:prstGeom prst="rect">
+            <a:avLst/>
+          </a:prstGeom>
+          <a:solidFill>
+            <a:srgbClr val="251E20"/>
+          </a:solidFill>
+        </p:spPr>
+      </p:sp>
+      <p:sp>
+        <p:nvSpPr>
+          <p:cNvPr id="20" name="TextBox 20"/>
+          <p:cNvSpPr txBox="1"/>
+          <p:nvPr/>
+        </p:nvSpPr>
+        <p:spPr>
+          <a:xfrm>
+            <a:off x="2209800" y="1528784"/>
+            <a:ext cx="13187156" cy="535403"/>
+          </a:xfrm>
+          <a:prstGeom prst="rect">
+            <a:avLst/>
+          </a:prstGeom>
+        </p:spPr>
+        <p:txBody>
+          <a:bodyPr lIns="0" tIns="0" rIns="0" bIns="0" rtlCol="0" anchor="t">
+            <a:spAutoFit/>
+          </a:bodyPr>
+          <a:lstStyle/>
+          <a:p>
+            <a:pPr>
+              <a:lnSpc>
+                <a:spcPts val="4544"/>
+              </a:lnSpc>
+            </a:pPr>
+            <a:r>
+              <a:rPr lang="fr-FR" sz="3200" spc="96" dirty="0">
+                <a:solidFill>
+                  <a:srgbClr val="251E20"/>
+                </a:solidFill>
+                <a:latin typeface="Roboto Bold"/>
+              </a:rPr>
+              <a:t>STRATEGIE DE FUSION PAR TABLEAUX CROISES</a:t>
+            </a:r>
+          </a:p>
+        </p:txBody>
+      </p:sp>
+      <p:pic>
+        <p:nvPicPr>
+          <p:cNvPr id="4" name="Picture 3">
+            <a:extLst>
+              <a:ext uri="{FF2B5EF4-FFF2-40B4-BE49-F238E27FC236}">
+                <a16:creationId xmlns:a16="http://schemas.microsoft.com/office/drawing/2014/main" id="{B9D2D305-5253-4788-ADE0-E15F7F347421}"/>
+              </a:ext>
+            </a:extLst>
+          </p:cNvPr>
+          <p:cNvPicPr>
+            <a:picLocks noChangeAspect="1"/>
+          </p:cNvPicPr>
+          <p:nvPr/>
+        </p:nvPicPr>
+        <p:blipFill>
+          <a:blip r:embed="rId2">
+            <a:extLst>
+              <a:ext uri="{28A0092B-C50C-407E-A947-70E740481C1C}">
+                <a14:useLocalDpi xmlns:a14="http://schemas.microsoft.com/office/drawing/2010/main" val="0"/>
+              </a:ext>
+            </a:extLst>
+          </a:blip>
+          <a:stretch>
+            <a:fillRect/>
+          </a:stretch>
+        </p:blipFill>
+        <p:spPr>
+          <a:xfrm>
+            <a:off x="2209800" y="2179084"/>
+            <a:ext cx="12447645" cy="7779778"/>
+          </a:xfrm>
+          <a:prstGeom prst="rect">
+            <a:avLst/>
+          </a:prstGeom>
+        </p:spPr>
+      </p:pic>
+      <p:sp>
+        <p:nvSpPr>
+          <p:cNvPr id="5" name="Rectangle 4">
+            <a:extLst>
+              <a:ext uri="{FF2B5EF4-FFF2-40B4-BE49-F238E27FC236}">
+                <a16:creationId xmlns:a16="http://schemas.microsoft.com/office/drawing/2014/main" id="{AD80C9D2-7240-4B97-81F5-B823730C92B0}"/>
+              </a:ext>
+            </a:extLst>
+          </p:cNvPr>
+          <p:cNvSpPr/>
+          <p:nvPr/>
+        </p:nvSpPr>
+        <p:spPr>
+          <a:xfrm>
+            <a:off x="4419600" y="9258300"/>
+            <a:ext cx="2286000" cy="338128"/>
+          </a:xfrm>
+          <a:prstGeom prst="rect">
+            <a:avLst/>
+          </a:prstGeom>
+          <a:noFill/>
+          <a:ln>
+            <a:solidFill>
+              <a:srgbClr val="FF0000"/>
+            </a:solidFill>
+          </a:ln>
+        </p:spPr>
+        <p:style>
+          <a:lnRef idx="2">
+            <a:schemeClr val="accent1">
+              <a:shade val="50000"/>
+            </a:schemeClr>
+          </a:lnRef>
+          <a:fillRef idx="1">
+            <a:schemeClr val="accent1"/>
+          </a:fillRef>
+          <a:effectRef idx="0">
+            <a:schemeClr val="accent1"/>
+          </a:effectRef>
+          <a:fontRef idx="minor">
+            <a:schemeClr val="lt1"/>
+          </a:fontRef>
+        </p:style>
+        <p:txBody>
+          <a:bodyPr rtlCol="0" anchor="ctr"/>
+          <a:lstStyle/>
+          <a:p>
+            <a:pPr algn="ctr"/>
+            <a:endParaRPr lang="en-US"/>
+          </a:p>
+        </p:txBody>
+      </p:sp>
+      <p:sp>
+        <p:nvSpPr>
+          <p:cNvPr id="18" name="Rectangle 17">
+            <a:extLst>
+              <a:ext uri="{FF2B5EF4-FFF2-40B4-BE49-F238E27FC236}">
+                <a16:creationId xmlns:a16="http://schemas.microsoft.com/office/drawing/2014/main" id="{61E835F0-C423-4F55-A7BB-50C508DA50CC}"/>
+              </a:ext>
+            </a:extLst>
+          </p:cNvPr>
+          <p:cNvSpPr/>
+          <p:nvPr/>
+        </p:nvSpPr>
+        <p:spPr>
+          <a:xfrm>
+            <a:off x="6781800" y="9258300"/>
+            <a:ext cx="1143000" cy="338128"/>
+          </a:xfrm>
+          <a:prstGeom prst="rect">
+            <a:avLst/>
+          </a:prstGeom>
+          <a:noFill/>
+          <a:ln>
+            <a:solidFill>
+              <a:srgbClr val="FF0000"/>
+            </a:solidFill>
+          </a:ln>
+        </p:spPr>
+        <p:style>
+          <a:lnRef idx="2">
+            <a:schemeClr val="accent1">
+              <a:shade val="50000"/>
+            </a:schemeClr>
+          </a:lnRef>
+          <a:fillRef idx="1">
+            <a:schemeClr val="accent1"/>
+          </a:fillRef>
+          <a:effectRef idx="0">
+            <a:schemeClr val="accent1"/>
+          </a:effectRef>
+          <a:fontRef idx="minor">
+            <a:schemeClr val="lt1"/>
+          </a:fontRef>
+        </p:style>
+        <p:txBody>
+          <a:bodyPr rtlCol="0" anchor="ctr"/>
+          <a:lstStyle/>
+          <a:p>
+            <a:pPr algn="ctr"/>
+            <a:endParaRPr lang="en-US"/>
+          </a:p>
+        </p:txBody>
+      </p:sp>
+      <p:sp>
+        <p:nvSpPr>
+          <p:cNvPr id="21" name="Rectangle 20">
+            <a:extLst>
+              <a:ext uri="{FF2B5EF4-FFF2-40B4-BE49-F238E27FC236}">
+                <a16:creationId xmlns:a16="http://schemas.microsoft.com/office/drawing/2014/main" id="{086E27C3-BE1B-4DCB-8118-6047F48745D7}"/>
+              </a:ext>
+            </a:extLst>
+          </p:cNvPr>
+          <p:cNvSpPr/>
+          <p:nvPr/>
+        </p:nvSpPr>
+        <p:spPr>
+          <a:xfrm>
+            <a:off x="8077200" y="9258300"/>
+            <a:ext cx="1143000" cy="338128"/>
+          </a:xfrm>
+          <a:prstGeom prst="rect">
+            <a:avLst/>
+          </a:prstGeom>
+          <a:noFill/>
+          <a:ln>
+            <a:solidFill>
+              <a:srgbClr val="FF0000"/>
+            </a:solidFill>
+          </a:ln>
+        </p:spPr>
+        <p:style>
+          <a:lnRef idx="2">
+            <a:schemeClr val="accent1">
+              <a:shade val="50000"/>
+            </a:schemeClr>
+          </a:lnRef>
+          <a:fillRef idx="1">
+            <a:schemeClr val="accent1"/>
+          </a:fillRef>
+          <a:effectRef idx="0">
+            <a:schemeClr val="accent1"/>
+          </a:effectRef>
+          <a:fontRef idx="minor">
+            <a:schemeClr val="lt1"/>
+          </a:fontRef>
+        </p:style>
+        <p:txBody>
+          <a:bodyPr rtlCol="0" anchor="ctr"/>
+          <a:lstStyle/>
+          <a:p>
+            <a:pPr algn="ctr"/>
+            <a:endParaRPr lang="en-US"/>
+          </a:p>
+        </p:txBody>
+      </p:sp>
+      <p:sp>
+        <p:nvSpPr>
+          <p:cNvPr id="24" name="Rectangle 23">
+            <a:extLst>
+              <a:ext uri="{FF2B5EF4-FFF2-40B4-BE49-F238E27FC236}">
+                <a16:creationId xmlns:a16="http://schemas.microsoft.com/office/drawing/2014/main" id="{CBBC7AFC-107F-49A3-8C89-3BBA0A178385}"/>
+              </a:ext>
+            </a:extLst>
+          </p:cNvPr>
+          <p:cNvSpPr/>
+          <p:nvPr/>
+        </p:nvSpPr>
+        <p:spPr>
+          <a:xfrm>
+            <a:off x="12496800" y="9258300"/>
+            <a:ext cx="1752600" cy="338128"/>
+          </a:xfrm>
+          <a:prstGeom prst="rect">
+            <a:avLst/>
+          </a:prstGeom>
+          <a:noFill/>
+          <a:ln>
+            <a:solidFill>
+              <a:srgbClr val="FF0000"/>
+            </a:solidFill>
+          </a:ln>
+        </p:spPr>
+        <p:style>
+          <a:lnRef idx="2">
+            <a:schemeClr val="accent1">
+              <a:shade val="50000"/>
+            </a:schemeClr>
+          </a:lnRef>
+          <a:fillRef idx="1">
+            <a:schemeClr val="accent1"/>
+          </a:fillRef>
+          <a:effectRef idx="0">
+            <a:schemeClr val="accent1"/>
+          </a:effectRef>
+          <a:fontRef idx="minor">
+            <a:schemeClr val="lt1"/>
+          </a:fontRef>
+        </p:style>
+        <p:txBody>
+          <a:bodyPr rtlCol="0" anchor="ctr"/>
+          <a:lstStyle/>
+          <a:p>
+            <a:pPr algn="ctr"/>
+            <a:endParaRPr lang="en-US"/>
+          </a:p>
+        </p:txBody>
+      </p:sp>
+      <p:sp>
+        <p:nvSpPr>
+          <p:cNvPr id="25" name="Rectangle 24">
+            <a:extLst>
+              <a:ext uri="{FF2B5EF4-FFF2-40B4-BE49-F238E27FC236}">
+                <a16:creationId xmlns:a16="http://schemas.microsoft.com/office/drawing/2014/main" id="{7F551294-1C8F-495A-8DF6-06526F9C55FB}"/>
+              </a:ext>
+            </a:extLst>
+          </p:cNvPr>
+          <p:cNvSpPr/>
+          <p:nvPr/>
+        </p:nvSpPr>
+        <p:spPr>
+          <a:xfrm>
+            <a:off x="10668000" y="9258300"/>
+            <a:ext cx="1752600" cy="338128"/>
+          </a:xfrm>
+          <a:prstGeom prst="rect">
+            <a:avLst/>
+          </a:prstGeom>
+          <a:noFill/>
+          <a:ln>
+            <a:solidFill>
+              <a:srgbClr val="FF0000"/>
+            </a:solidFill>
+          </a:ln>
+        </p:spPr>
+        <p:style>
+          <a:lnRef idx="2">
+            <a:schemeClr val="accent1">
+              <a:shade val="50000"/>
+            </a:schemeClr>
+          </a:lnRef>
+          <a:fillRef idx="1">
+            <a:schemeClr val="accent1"/>
+          </a:fillRef>
+          <a:effectRef idx="0">
+            <a:schemeClr val="accent1"/>
+          </a:effectRef>
+          <a:fontRef idx="minor">
+            <a:schemeClr val="lt1"/>
+          </a:fontRef>
+        </p:style>
+        <p:txBody>
+          <a:bodyPr rtlCol="0" anchor="ctr"/>
+          <a:lstStyle/>
+          <a:p>
+            <a:pPr algn="ctr"/>
+            <a:endParaRPr lang="en-US"/>
+          </a:p>
+        </p:txBody>
+      </p:sp>
+      <p:sp>
+        <p:nvSpPr>
+          <p:cNvPr id="10" name="Freeform: Shape 9">
+            <a:extLst>
+              <a:ext uri="{FF2B5EF4-FFF2-40B4-BE49-F238E27FC236}">
+                <a16:creationId xmlns:a16="http://schemas.microsoft.com/office/drawing/2014/main" id="{DB385583-1A6A-42F5-899C-5DCD6590C400}"/>
+              </a:ext>
+            </a:extLst>
+          </p:cNvPr>
+          <p:cNvSpPr/>
+          <p:nvPr/>
+        </p:nvSpPr>
+        <p:spPr>
+          <a:xfrm>
+            <a:off x="8645236" y="9601200"/>
+            <a:ext cx="4765964" cy="415636"/>
+          </a:xfrm>
+          <a:custGeom>
+            <a:avLst/>
+            <a:gdLst>
+              <a:gd name="connsiteX0" fmla="*/ 0 w 4765964"/>
+              <a:gd name="connsiteY0" fmla="*/ 0 h 415636"/>
+              <a:gd name="connsiteX1" fmla="*/ 1814946 w 4765964"/>
+              <a:gd name="connsiteY1" fmla="*/ 415636 h 415636"/>
+              <a:gd name="connsiteX2" fmla="*/ 4765964 w 4765964"/>
+              <a:gd name="connsiteY2" fmla="*/ 0 h 415636"/>
+            </a:gdLst>
+            <a:ahLst/>
+            <a:cxnLst>
+              <a:cxn ang="0">
+                <a:pos x="connsiteX0" y="connsiteY0"/>
+              </a:cxn>
+              <a:cxn ang="0">
+                <a:pos x="connsiteX1" y="connsiteY1"/>
+              </a:cxn>
+              <a:cxn ang="0">
+                <a:pos x="connsiteX2" y="connsiteY2"/>
+              </a:cxn>
+            </a:cxnLst>
+            <a:rect l="l" t="t" r="r" b="b"/>
+            <a:pathLst>
+              <a:path w="4765964" h="415636">
+                <a:moveTo>
+                  <a:pt x="0" y="0"/>
+                </a:moveTo>
+                <a:cubicBezTo>
+                  <a:pt x="510309" y="207818"/>
+                  <a:pt x="1020619" y="415636"/>
+                  <a:pt x="1814946" y="415636"/>
+                </a:cubicBezTo>
+                <a:cubicBezTo>
+                  <a:pt x="2609273" y="415636"/>
+                  <a:pt x="3687618" y="207818"/>
+                  <a:pt x="4765964" y="0"/>
+                </a:cubicBezTo>
+              </a:path>
+            </a:pathLst>
+          </a:custGeom>
+          <a:noFill/>
+          <a:ln>
+            <a:solidFill>
+              <a:srgbClr val="FF0000"/>
+            </a:solidFill>
+          </a:ln>
+        </p:spPr>
+        <p:style>
+          <a:lnRef idx="2">
+            <a:schemeClr val="accent1">
+              <a:shade val="50000"/>
+            </a:schemeClr>
+          </a:lnRef>
+          <a:fillRef idx="1">
+            <a:schemeClr val="accent1"/>
+          </a:fillRef>
+          <a:effectRef idx="0">
+            <a:schemeClr val="accent1"/>
+          </a:effectRef>
+          <a:fontRef idx="minor">
+            <a:schemeClr val="lt1"/>
+          </a:fontRef>
+        </p:style>
+        <p:txBody>
+          <a:bodyPr rtlCol="0" anchor="ctr"/>
+          <a:lstStyle/>
+          <a:p>
+            <a:pPr algn="ctr"/>
+            <a:endParaRPr lang="en-US"/>
+          </a:p>
+        </p:txBody>
+      </p:sp>
+    </p:spTree>
+    <p:extLst>
+      <p:ext uri="{BB962C8B-B14F-4D97-AF65-F5344CB8AC3E}">
+        <p14:creationId xmlns:p14="http://schemas.microsoft.com/office/powerpoint/2010/main" val="1057323221"/>
+      </p:ext>
+    </p:extLst>
+  </p:cSld>
+  <p:clrMapOvr>
+    <a:masterClrMapping/>
+  </p:clrMapOvr>
+</p:sld>
+</file>
+
+<file path=ppt/slides/slide18.xml><?xml version="1.0" encoding="utf-8"?>
+<p:sld xmlns:a="http://schemas.openxmlformats.org/drawingml/2006/main" xmlns:r="http://schemas.openxmlformats.org/officeDocument/2006/relationships" xmlns:p="http://schemas.openxmlformats.org/presentationml/2006/main">
+  <p:cSld>
+    <p:spTree>
+      <p:nvGrpSpPr>
+        <p:cNvPr id="1" name=""/>
+        <p:cNvGrpSpPr/>
+        <p:nvPr/>
+      </p:nvGrpSpPr>
+      <p:grpSpPr>
+        <a:xfrm>
+          <a:off x="0" y="0"/>
+          <a:ext cx="0" cy="0"/>
+          <a:chOff x="0" y="0"/>
+          <a:chExt cx="0" cy="0"/>
+        </a:xfrm>
+      </p:grpSpPr>
+      <p:sp>
+        <p:nvSpPr>
+          <p:cNvPr id="2" name="TextBox 2"/>
+          <p:cNvSpPr txBox="1"/>
+          <p:nvPr/>
+        </p:nvSpPr>
+        <p:spPr>
+          <a:xfrm>
+            <a:off x="2209800" y="690572"/>
+            <a:ext cx="13187156" cy="961802"/>
+          </a:xfrm>
+          <a:prstGeom prst="rect">
+            <a:avLst/>
+          </a:prstGeom>
+        </p:spPr>
+        <p:txBody>
+          <a:bodyPr lIns="0" tIns="0" rIns="0" bIns="0" rtlCol="0" anchor="t">
+            <a:spAutoFit/>
+          </a:bodyPr>
+          <a:lstStyle/>
+          <a:p>
+            <a:pPr>
+              <a:lnSpc>
+                <a:spcPts val="7952"/>
+              </a:lnSpc>
+            </a:pPr>
+            <a:r>
+              <a:rPr lang="fr-FR" sz="5600" spc="168" dirty="0">
+                <a:solidFill>
+                  <a:srgbClr val="251E20"/>
+                </a:solidFill>
+                <a:latin typeface="Roboto Bold"/>
+              </a:rPr>
+              <a:t>ANNEXES (4/5)</a:t>
+            </a:r>
+          </a:p>
+        </p:txBody>
+      </p:sp>
+      <p:sp>
+        <p:nvSpPr>
+          <p:cNvPr id="6" name="AutoShape 6"/>
+          <p:cNvSpPr/>
+          <p:nvPr/>
+        </p:nvSpPr>
+        <p:spPr>
+          <a:xfrm>
+            <a:off x="17712550" y="4187551"/>
+            <a:ext cx="41785" cy="760681"/>
+          </a:xfrm>
+          <a:prstGeom prst="rect">
+            <a:avLst/>
+          </a:prstGeom>
+          <a:solidFill>
+            <a:srgbClr val="251E20"/>
+          </a:solidFill>
+        </p:spPr>
+      </p:sp>
+      <p:sp>
+        <p:nvSpPr>
+          <p:cNvPr id="7" name="AutoShape 7"/>
+          <p:cNvSpPr/>
+          <p:nvPr/>
+        </p:nvSpPr>
+        <p:spPr>
+          <a:xfrm>
+            <a:off x="17712550" y="2740928"/>
+            <a:ext cx="41785" cy="760681"/>
+          </a:xfrm>
+          <a:prstGeom prst="rect">
+            <a:avLst/>
+          </a:prstGeom>
+          <a:solidFill>
+            <a:srgbClr val="251E20"/>
+          </a:solidFill>
+        </p:spPr>
+      </p:sp>
+      <p:sp>
+        <p:nvSpPr>
+          <p:cNvPr id="8" name="TextBox 8"/>
+          <p:cNvSpPr txBox="1"/>
+          <p:nvPr/>
+        </p:nvSpPr>
+        <p:spPr>
+          <a:xfrm>
+            <a:off x="17390840" y="1047750"/>
+            <a:ext cx="513755" cy="415290"/>
+          </a:xfrm>
+          <a:prstGeom prst="rect">
+            <a:avLst/>
+          </a:prstGeom>
+        </p:spPr>
+        <p:txBody>
+          <a:bodyPr lIns="0" tIns="0" rIns="0" bIns="0" rtlCol="0" anchor="t">
+            <a:spAutoFit/>
+          </a:bodyPr>
+          <a:lstStyle/>
+          <a:p>
+            <a:pPr algn="r">
+              <a:lnSpc>
+                <a:spcPts val="3359"/>
+              </a:lnSpc>
+              <a:spcBef>
+                <a:spcPct val="0"/>
+              </a:spcBef>
+            </a:pPr>
+            <a:r>
+              <a:rPr lang="fr-FR" sz="2400" dirty="0">
+                <a:solidFill>
+                  <a:srgbClr val="251E20"/>
+                </a:solidFill>
+                <a:latin typeface="Roboto"/>
+              </a:rPr>
+              <a:t>IV</a:t>
+            </a:r>
+          </a:p>
+        </p:txBody>
+      </p:sp>
+      <p:sp>
+        <p:nvSpPr>
+          <p:cNvPr id="9" name="AutoShape 9"/>
+          <p:cNvSpPr/>
+          <p:nvPr/>
+        </p:nvSpPr>
+        <p:spPr>
+          <a:xfrm>
+            <a:off x="17533417" y="8191500"/>
+            <a:ext cx="228600" cy="4191000"/>
+          </a:xfrm>
+          <a:prstGeom prst="rect">
+            <a:avLst/>
+          </a:prstGeom>
+          <a:solidFill>
+            <a:srgbClr val="251E20"/>
+          </a:solidFill>
+        </p:spPr>
+      </p:sp>
+      <p:sp>
+        <p:nvSpPr>
+          <p:cNvPr id="19" name="AutoShape 19"/>
+          <p:cNvSpPr/>
+          <p:nvPr/>
+        </p:nvSpPr>
+        <p:spPr>
+          <a:xfrm>
+            <a:off x="-1066800" y="823922"/>
+            <a:ext cx="2095500" cy="1278235"/>
+          </a:xfrm>
+          <a:prstGeom prst="rect">
+            <a:avLst/>
+          </a:prstGeom>
+          <a:solidFill>
+            <a:srgbClr val="251E20"/>
+          </a:solidFill>
+        </p:spPr>
+      </p:sp>
+      <p:sp>
+        <p:nvSpPr>
+          <p:cNvPr id="20" name="TextBox 20"/>
+          <p:cNvSpPr txBox="1"/>
+          <p:nvPr/>
+        </p:nvSpPr>
+        <p:spPr>
+          <a:xfrm>
+            <a:off x="2209800" y="1528784"/>
+            <a:ext cx="13187156" cy="535403"/>
+          </a:xfrm>
+          <a:prstGeom prst="rect">
+            <a:avLst/>
+          </a:prstGeom>
+        </p:spPr>
+        <p:txBody>
+          <a:bodyPr lIns="0" tIns="0" rIns="0" bIns="0" rtlCol="0" anchor="t">
+            <a:spAutoFit/>
+          </a:bodyPr>
+          <a:lstStyle/>
+          <a:p>
+            <a:pPr>
+              <a:lnSpc>
+                <a:spcPts val="4544"/>
+              </a:lnSpc>
+            </a:pPr>
+            <a:r>
+              <a:rPr lang="fr-FR" sz="3200" spc="96" dirty="0">
+                <a:solidFill>
+                  <a:srgbClr val="251E20"/>
+                </a:solidFill>
+                <a:latin typeface="Roboto Bold"/>
+              </a:rPr>
+              <a:t>CORRELATION ET DEPENDANCE ENTRE VARIABLES</a:t>
+            </a:r>
+          </a:p>
+        </p:txBody>
+      </p:sp>
+      <p:pic>
+        <p:nvPicPr>
+          <p:cNvPr id="11" name="Picture 10">
+            <a:extLst>
+              <a:ext uri="{FF2B5EF4-FFF2-40B4-BE49-F238E27FC236}">
+                <a16:creationId xmlns:a16="http://schemas.microsoft.com/office/drawing/2014/main" id="{7A583E11-619E-4584-9685-FD6C4F3C1B37}"/>
+              </a:ext>
+            </a:extLst>
+          </p:cNvPr>
+          <p:cNvPicPr>
+            <a:picLocks noChangeAspect="1"/>
+          </p:cNvPicPr>
+          <p:nvPr/>
+        </p:nvPicPr>
+        <p:blipFill rotWithShape="1">
+          <a:blip r:embed="rId2">
+            <a:extLst>
+              <a:ext uri="{28A0092B-C50C-407E-A947-70E740481C1C}">
+                <a14:useLocalDpi xmlns:a14="http://schemas.microsoft.com/office/drawing/2010/main" val="0"/>
+              </a:ext>
+            </a:extLst>
+          </a:blip>
+          <a:srcRect l="11392" r="15658"/>
+          <a:stretch/>
+        </p:blipFill>
+        <p:spPr>
+          <a:xfrm>
+            <a:off x="161347" y="2518294"/>
+            <a:ext cx="8667431" cy="7425806"/>
+          </a:xfrm>
+          <a:prstGeom prst="rect">
+            <a:avLst/>
+          </a:prstGeom>
+        </p:spPr>
+      </p:pic>
+      <p:pic>
+        <p:nvPicPr>
+          <p:cNvPr id="13" name="Picture 12">
+            <a:extLst>
+              <a:ext uri="{FF2B5EF4-FFF2-40B4-BE49-F238E27FC236}">
+                <a16:creationId xmlns:a16="http://schemas.microsoft.com/office/drawing/2014/main" id="{ADA6220F-8EEE-4B55-B78E-B6313533D7E1}"/>
+              </a:ext>
+            </a:extLst>
+          </p:cNvPr>
+          <p:cNvPicPr>
+            <a:picLocks noChangeAspect="1"/>
+          </p:cNvPicPr>
+          <p:nvPr/>
+        </p:nvPicPr>
+        <p:blipFill rotWithShape="1">
+          <a:blip r:embed="rId3">
+            <a:extLst>
+              <a:ext uri="{28A0092B-C50C-407E-A947-70E740481C1C}">
+                <a14:useLocalDpi xmlns:a14="http://schemas.microsoft.com/office/drawing/2010/main" val="0"/>
+              </a:ext>
+            </a:extLst>
+          </a:blip>
+          <a:srcRect l="9846" r="16968"/>
+          <a:stretch/>
+        </p:blipFill>
+        <p:spPr>
+          <a:xfrm>
+            <a:off x="8629970" y="2490585"/>
+            <a:ext cx="8667430" cy="7401968"/>
+          </a:xfrm>
+          <a:prstGeom prst="rect">
+            <a:avLst/>
+          </a:prstGeom>
+        </p:spPr>
+      </p:pic>
+      <p:sp>
+        <p:nvSpPr>
+          <p:cNvPr id="22" name="TextBox 20">
+            <a:extLst>
+              <a:ext uri="{FF2B5EF4-FFF2-40B4-BE49-F238E27FC236}">
+                <a16:creationId xmlns:a16="http://schemas.microsoft.com/office/drawing/2014/main" id="{CF4B04C4-1F32-4791-8E5B-42126974EF1D}"/>
+              </a:ext>
+            </a:extLst>
+          </p:cNvPr>
+          <p:cNvSpPr txBox="1"/>
+          <p:nvPr/>
+        </p:nvSpPr>
+        <p:spPr>
+          <a:xfrm>
+            <a:off x="685800" y="9195376"/>
+            <a:ext cx="4114800" cy="535403"/>
+          </a:xfrm>
+          <a:prstGeom prst="rect">
+            <a:avLst/>
+          </a:prstGeom>
+        </p:spPr>
+        <p:txBody>
+          <a:bodyPr wrap="square" lIns="0" tIns="0" rIns="0" bIns="0" rtlCol="0" anchor="t">
+            <a:spAutoFit/>
+          </a:bodyPr>
+          <a:lstStyle/>
+          <a:p>
+            <a:pPr>
+              <a:lnSpc>
+                <a:spcPts val="4544"/>
+              </a:lnSpc>
+            </a:pPr>
+            <a:r>
+              <a:rPr lang="fr-FR" sz="3200" spc="96" dirty="0">
+                <a:solidFill>
+                  <a:srgbClr val="251E20"/>
+                </a:solidFill>
+                <a:latin typeface="Roboto Bold"/>
+              </a:rPr>
+              <a:t>Variables continues</a:t>
+            </a:r>
+          </a:p>
+        </p:txBody>
+      </p:sp>
+      <p:sp>
+        <p:nvSpPr>
+          <p:cNvPr id="23" name="TextBox 20">
+            <a:extLst>
+              <a:ext uri="{FF2B5EF4-FFF2-40B4-BE49-F238E27FC236}">
+                <a16:creationId xmlns:a16="http://schemas.microsoft.com/office/drawing/2014/main" id="{83B5CC8B-C292-4DF0-BFFD-142EC1F9992D}"/>
+              </a:ext>
+            </a:extLst>
+          </p:cNvPr>
+          <p:cNvSpPr txBox="1"/>
+          <p:nvPr/>
+        </p:nvSpPr>
+        <p:spPr>
+          <a:xfrm>
+            <a:off x="9372296" y="9195376"/>
+            <a:ext cx="5181904" cy="535403"/>
+          </a:xfrm>
+          <a:prstGeom prst="rect">
+            <a:avLst/>
+          </a:prstGeom>
+        </p:spPr>
+        <p:txBody>
+          <a:bodyPr wrap="square" lIns="0" tIns="0" rIns="0" bIns="0" rtlCol="0" anchor="t">
+            <a:spAutoFit/>
+          </a:bodyPr>
+          <a:lstStyle/>
+          <a:p>
+            <a:pPr>
+              <a:lnSpc>
+                <a:spcPts val="4544"/>
+              </a:lnSpc>
+            </a:pPr>
+            <a:r>
+              <a:rPr lang="fr-FR" sz="3200" spc="96" dirty="0">
+                <a:solidFill>
+                  <a:srgbClr val="251E20"/>
+                </a:solidFill>
+                <a:latin typeface="Roboto Bold"/>
+              </a:rPr>
+              <a:t>Variables catégorielles</a:t>
+            </a:r>
+          </a:p>
+        </p:txBody>
+      </p:sp>
+    </p:spTree>
+    <p:extLst>
+      <p:ext uri="{BB962C8B-B14F-4D97-AF65-F5344CB8AC3E}">
+        <p14:creationId xmlns:p14="http://schemas.microsoft.com/office/powerpoint/2010/main" val="3360100666"/>
+      </p:ext>
+    </p:extLst>
+  </p:cSld>
+  <p:clrMapOvr>
+    <a:masterClrMapping/>
+  </p:clrMapOvr>
+</p:sld>
+</file>
+
+<file path=ppt/slides/slide19.xml><?xml version="1.0" encoding="utf-8"?>
+<p:sld xmlns:a="http://schemas.openxmlformats.org/drawingml/2006/main" xmlns:r="http://schemas.openxmlformats.org/officeDocument/2006/relationships" xmlns:p="http://schemas.openxmlformats.org/presentationml/2006/main">
+  <p:cSld>
+    <p:spTree>
+      <p:nvGrpSpPr>
+        <p:cNvPr id="1" name=""/>
+        <p:cNvGrpSpPr/>
+        <p:nvPr/>
+      </p:nvGrpSpPr>
+      <p:grpSpPr>
+        <a:xfrm>
+          <a:off x="0" y="0"/>
+          <a:ext cx="0" cy="0"/>
+          <a:chOff x="0" y="0"/>
+          <a:chExt cx="0" cy="0"/>
+        </a:xfrm>
+      </p:grpSpPr>
+      <p:sp>
+        <p:nvSpPr>
+          <p:cNvPr id="2" name="TextBox 2"/>
+          <p:cNvSpPr txBox="1"/>
+          <p:nvPr/>
+        </p:nvSpPr>
+        <p:spPr>
+          <a:xfrm>
+            <a:off x="2209800" y="690572"/>
+            <a:ext cx="13187156" cy="961802"/>
+          </a:xfrm>
+          <a:prstGeom prst="rect">
+            <a:avLst/>
+          </a:prstGeom>
+        </p:spPr>
+        <p:txBody>
+          <a:bodyPr lIns="0" tIns="0" rIns="0" bIns="0" rtlCol="0" anchor="t">
+            <a:spAutoFit/>
+          </a:bodyPr>
+          <a:lstStyle/>
+          <a:p>
+            <a:pPr>
+              <a:lnSpc>
+                <a:spcPts val="7952"/>
+              </a:lnSpc>
+            </a:pPr>
+            <a:r>
+              <a:rPr lang="fr-FR" sz="5600" spc="168" dirty="0">
+                <a:solidFill>
+                  <a:srgbClr val="251E20"/>
+                </a:solidFill>
+                <a:latin typeface="Roboto Bold"/>
+              </a:rPr>
+              <a:t>ANNEXES (5/5)</a:t>
+            </a:r>
+          </a:p>
+        </p:txBody>
+      </p:sp>
+      <p:sp>
+        <p:nvSpPr>
+          <p:cNvPr id="6" name="AutoShape 6"/>
+          <p:cNvSpPr/>
+          <p:nvPr/>
+        </p:nvSpPr>
+        <p:spPr>
+          <a:xfrm>
+            <a:off x="17712550" y="4227923"/>
+            <a:ext cx="41785" cy="760681"/>
+          </a:xfrm>
+          <a:prstGeom prst="rect">
+            <a:avLst/>
+          </a:prstGeom>
+          <a:solidFill>
+            <a:srgbClr val="251E20"/>
+          </a:solidFill>
+        </p:spPr>
+      </p:sp>
+      <p:sp>
+        <p:nvSpPr>
+          <p:cNvPr id="7" name="AutoShape 7"/>
+          <p:cNvSpPr/>
+          <p:nvPr/>
+        </p:nvSpPr>
+        <p:spPr>
+          <a:xfrm>
+            <a:off x="17712550" y="2781300"/>
+            <a:ext cx="41785" cy="760681"/>
+          </a:xfrm>
+          <a:prstGeom prst="rect">
+            <a:avLst/>
+          </a:prstGeom>
+          <a:solidFill>
+            <a:srgbClr val="251E20"/>
+          </a:solidFill>
+        </p:spPr>
+      </p:sp>
+      <p:sp>
+        <p:nvSpPr>
+          <p:cNvPr id="8" name="TextBox 8"/>
+          <p:cNvSpPr txBox="1"/>
+          <p:nvPr/>
+        </p:nvSpPr>
+        <p:spPr>
+          <a:xfrm>
+            <a:off x="17390840" y="1047750"/>
+            <a:ext cx="513755" cy="415290"/>
+          </a:xfrm>
+          <a:prstGeom prst="rect">
+            <a:avLst/>
+          </a:prstGeom>
+        </p:spPr>
+        <p:txBody>
+          <a:bodyPr lIns="0" tIns="0" rIns="0" bIns="0" rtlCol="0" anchor="t">
+            <a:spAutoFit/>
+          </a:bodyPr>
+          <a:lstStyle/>
+          <a:p>
+            <a:pPr algn="r">
+              <a:lnSpc>
+                <a:spcPts val="3359"/>
+              </a:lnSpc>
+              <a:spcBef>
+                <a:spcPct val="0"/>
+              </a:spcBef>
+            </a:pPr>
+            <a:r>
+              <a:rPr lang="fr-FR" sz="2400" dirty="0">
+                <a:solidFill>
+                  <a:srgbClr val="251E20"/>
+                </a:solidFill>
+                <a:latin typeface="Roboto"/>
+              </a:rPr>
+              <a:t>V</a:t>
+            </a:r>
+          </a:p>
+        </p:txBody>
+      </p:sp>
+      <p:sp>
+        <p:nvSpPr>
+          <p:cNvPr id="9" name="AutoShape 9"/>
+          <p:cNvSpPr/>
+          <p:nvPr/>
+        </p:nvSpPr>
+        <p:spPr>
+          <a:xfrm>
+            <a:off x="17533417" y="8191500"/>
+            <a:ext cx="228600" cy="4191000"/>
+          </a:xfrm>
+          <a:prstGeom prst="rect">
+            <a:avLst/>
+          </a:prstGeom>
+          <a:solidFill>
+            <a:srgbClr val="251E20"/>
+          </a:solidFill>
+        </p:spPr>
+      </p:sp>
+      <p:sp>
+        <p:nvSpPr>
+          <p:cNvPr id="19" name="AutoShape 19"/>
+          <p:cNvSpPr/>
+          <p:nvPr/>
+        </p:nvSpPr>
+        <p:spPr>
+          <a:xfrm>
+            <a:off x="-1066800" y="823922"/>
+            <a:ext cx="2095500" cy="1278235"/>
+          </a:xfrm>
+          <a:prstGeom prst="rect">
+            <a:avLst/>
+          </a:prstGeom>
+          <a:solidFill>
+            <a:srgbClr val="251E20"/>
+          </a:solidFill>
+        </p:spPr>
+      </p:sp>
+      <p:sp>
+        <p:nvSpPr>
+          <p:cNvPr id="20" name="TextBox 20"/>
+          <p:cNvSpPr txBox="1"/>
+          <p:nvPr/>
+        </p:nvSpPr>
+        <p:spPr>
+          <a:xfrm>
+            <a:off x="2209800" y="1528784"/>
+            <a:ext cx="13187156" cy="535403"/>
+          </a:xfrm>
+          <a:prstGeom prst="rect">
+            <a:avLst/>
+          </a:prstGeom>
+        </p:spPr>
+        <p:txBody>
+          <a:bodyPr lIns="0" tIns="0" rIns="0" bIns="0" rtlCol="0" anchor="t">
+            <a:spAutoFit/>
+          </a:bodyPr>
+          <a:lstStyle/>
+          <a:p>
+            <a:pPr>
+              <a:lnSpc>
+                <a:spcPts val="4544"/>
+              </a:lnSpc>
+            </a:pPr>
+            <a:r>
+              <a:rPr lang="fr-FR" sz="3200" spc="96" dirty="0">
+                <a:solidFill>
+                  <a:srgbClr val="251E20"/>
+                </a:solidFill>
+                <a:latin typeface="Roboto Bold"/>
+              </a:rPr>
+              <a:t>GRILLES D’HYPERPARAMETRISATION DES MODELES</a:t>
+            </a:r>
+          </a:p>
+        </p:txBody>
+      </p:sp>
+      <p:grpSp>
+        <p:nvGrpSpPr>
+          <p:cNvPr id="14" name="Group 10">
+            <a:extLst>
+              <a:ext uri="{FF2B5EF4-FFF2-40B4-BE49-F238E27FC236}">
+                <a16:creationId xmlns:a16="http://schemas.microsoft.com/office/drawing/2014/main" id="{AFE1FF4B-8BD6-4FD3-AE37-4D0FDFA2D9E1}"/>
+              </a:ext>
+            </a:extLst>
+          </p:cNvPr>
+          <p:cNvGrpSpPr/>
+          <p:nvPr/>
+        </p:nvGrpSpPr>
+        <p:grpSpPr>
+          <a:xfrm>
+            <a:off x="90809" y="2519181"/>
+            <a:ext cx="7506397" cy="893060"/>
+            <a:chOff x="0" y="-76200"/>
+            <a:chExt cx="9125299" cy="1190747"/>
+          </a:xfrm>
+        </p:grpSpPr>
+        <p:sp>
+          <p:nvSpPr>
+            <p:cNvPr id="15" name="TextBox 11">
+              <a:extLst>
+                <a:ext uri="{FF2B5EF4-FFF2-40B4-BE49-F238E27FC236}">
+                  <a16:creationId xmlns:a16="http://schemas.microsoft.com/office/drawing/2014/main" id="{F21A9240-C6D1-4DF4-9363-CC5B2A2FC523}"/>
+                </a:ext>
+              </a:extLst>
+            </p:cNvPr>
+            <p:cNvSpPr txBox="1"/>
+            <p:nvPr/>
+          </p:nvSpPr>
+          <p:spPr>
+            <a:xfrm>
+              <a:off x="0" y="-76200"/>
+              <a:ext cx="9125299" cy="666850"/>
+            </a:xfrm>
+            <a:prstGeom prst="rect">
+              <a:avLst/>
+            </a:prstGeom>
+          </p:spPr>
+          <p:txBody>
+            <a:bodyPr lIns="0" tIns="0" rIns="0" bIns="0" rtlCol="0" anchor="t">
+              <a:spAutoFit/>
+            </a:bodyPr>
+            <a:lstStyle/>
+            <a:p>
+              <a:pPr marL="704850" lvl="1" indent="-457200">
+                <a:lnSpc>
+                  <a:spcPts val="4200"/>
+                </a:lnSpc>
+                <a:buFont typeface="Arial"/>
+                <a:buChar char="•"/>
+              </a:pPr>
+              <a:r>
+                <a:rPr lang="fr-FR" sz="2400" spc="359" dirty="0">
+                  <a:solidFill>
+                    <a:srgbClr val="251E20"/>
+                  </a:solidFill>
+                  <a:latin typeface="Roboto"/>
+                </a:rPr>
+                <a:t>Arbre de décision</a:t>
+              </a:r>
+              <a:endParaRPr lang="fr-FR" sz="1400" dirty="0">
+                <a:cs typeface="Calibri"/>
+              </a:endParaRPr>
+            </a:p>
+          </p:txBody>
+        </p:sp>
+        <p:sp>
+          <p:nvSpPr>
+            <p:cNvPr id="16" name="TextBox 12">
+              <a:extLst>
+                <a:ext uri="{FF2B5EF4-FFF2-40B4-BE49-F238E27FC236}">
+                  <a16:creationId xmlns:a16="http://schemas.microsoft.com/office/drawing/2014/main" id="{F034B849-1A33-4533-A0A9-E7EF07672999}"/>
+                </a:ext>
+              </a:extLst>
+            </p:cNvPr>
+            <p:cNvSpPr txBox="1"/>
+            <p:nvPr/>
+          </p:nvSpPr>
+          <p:spPr>
+            <a:xfrm>
+              <a:off x="0" y="567388"/>
+              <a:ext cx="9125299" cy="547159"/>
+            </a:xfrm>
+            <a:prstGeom prst="rect">
+              <a:avLst/>
+            </a:prstGeom>
+          </p:spPr>
+          <p:txBody>
+            <a:bodyPr lIns="0" tIns="0" rIns="0" bIns="0" rtlCol="0" anchor="t">
+              <a:spAutoFit/>
+            </a:bodyPr>
+            <a:lstStyle/>
+            <a:p>
+              <a:pPr marL="1371600" lvl="2" indent="-457200">
+                <a:lnSpc>
+                  <a:spcPts val="3640"/>
+                </a:lnSpc>
+                <a:buClr>
+                  <a:srgbClr val="00B050"/>
+                </a:buClr>
+                <a:buFont typeface="Wingdings" panose="05000000000000000000" pitchFamily="2" charset="2"/>
+                <a:buChar char="ü"/>
+              </a:pPr>
+              <a:r>
+                <a:rPr lang="fr-FR" sz="2000" dirty="0">
+                  <a:solidFill>
+                    <a:srgbClr val="251E20"/>
+                  </a:solidFill>
+                  <a:latin typeface="Roboto"/>
+                </a:rPr>
+                <a:t>Profondeur maximale : 1 à 5 par 1</a:t>
+              </a:r>
+            </a:p>
+          </p:txBody>
+        </p:sp>
+      </p:grpSp>
+      <p:grpSp>
+        <p:nvGrpSpPr>
+          <p:cNvPr id="17" name="Group 10">
+            <a:extLst>
+              <a:ext uri="{FF2B5EF4-FFF2-40B4-BE49-F238E27FC236}">
+                <a16:creationId xmlns:a16="http://schemas.microsoft.com/office/drawing/2014/main" id="{4BF34921-9C47-4677-A2C6-B6E3D18576A3}"/>
+              </a:ext>
+            </a:extLst>
+          </p:cNvPr>
+          <p:cNvGrpSpPr/>
+          <p:nvPr/>
+        </p:nvGrpSpPr>
+        <p:grpSpPr>
+          <a:xfrm>
+            <a:off x="5763977" y="2619223"/>
+            <a:ext cx="8104423" cy="1816389"/>
+            <a:chOff x="0" y="-76200"/>
+            <a:chExt cx="9125299" cy="2421852"/>
+          </a:xfrm>
+        </p:grpSpPr>
+        <p:sp>
+          <p:nvSpPr>
+            <p:cNvPr id="18" name="TextBox 11">
+              <a:extLst>
+                <a:ext uri="{FF2B5EF4-FFF2-40B4-BE49-F238E27FC236}">
+                  <a16:creationId xmlns:a16="http://schemas.microsoft.com/office/drawing/2014/main" id="{B3A57B13-F6A6-4541-842D-CB60D63D2F2F}"/>
+                </a:ext>
+              </a:extLst>
+            </p:cNvPr>
+            <p:cNvSpPr txBox="1"/>
+            <p:nvPr/>
+          </p:nvSpPr>
+          <p:spPr>
+            <a:xfrm>
+              <a:off x="0" y="-76200"/>
+              <a:ext cx="9125299" cy="666850"/>
+            </a:xfrm>
+            <a:prstGeom prst="rect">
+              <a:avLst/>
+            </a:prstGeom>
+          </p:spPr>
+          <p:txBody>
+            <a:bodyPr lIns="0" tIns="0" rIns="0" bIns="0" rtlCol="0" anchor="t">
+              <a:spAutoFit/>
+            </a:bodyPr>
+            <a:lstStyle/>
+            <a:p>
+              <a:pPr marL="704850" lvl="1" indent="-457200">
+                <a:lnSpc>
+                  <a:spcPts val="4200"/>
+                </a:lnSpc>
+                <a:buFont typeface="Arial"/>
+                <a:buChar char="•"/>
+              </a:pPr>
+              <a:r>
+                <a:rPr lang="fr-FR" sz="2400" spc="359" dirty="0">
+                  <a:solidFill>
+                    <a:srgbClr val="251E20"/>
+                  </a:solidFill>
+                  <a:latin typeface="Roboto"/>
+                </a:rPr>
+                <a:t>Forêt aléatoire</a:t>
+              </a:r>
+              <a:endParaRPr lang="fr-FR" sz="1400" dirty="0">
+                <a:cs typeface="Calibri"/>
+              </a:endParaRPr>
+            </a:p>
+          </p:txBody>
+        </p:sp>
+        <p:sp>
+          <p:nvSpPr>
+            <p:cNvPr id="21" name="TextBox 12">
+              <a:extLst>
+                <a:ext uri="{FF2B5EF4-FFF2-40B4-BE49-F238E27FC236}">
+                  <a16:creationId xmlns:a16="http://schemas.microsoft.com/office/drawing/2014/main" id="{ACED0DC4-78A6-4C19-9417-E7E903EE718A}"/>
+                </a:ext>
+              </a:extLst>
+            </p:cNvPr>
+            <p:cNvSpPr txBox="1"/>
+            <p:nvPr/>
+          </p:nvSpPr>
+          <p:spPr>
+            <a:xfrm>
+              <a:off x="0" y="567388"/>
+              <a:ext cx="9125299" cy="1778264"/>
+            </a:xfrm>
+            <a:prstGeom prst="rect">
+              <a:avLst/>
+            </a:prstGeom>
+          </p:spPr>
+          <p:txBody>
+            <a:bodyPr lIns="0" tIns="0" rIns="0" bIns="0" rtlCol="0" anchor="t">
+              <a:spAutoFit/>
+            </a:bodyPr>
+            <a:lstStyle/>
+            <a:p>
+              <a:pPr marL="1371600" lvl="2" indent="-457200">
+                <a:lnSpc>
+                  <a:spcPts val="3640"/>
+                </a:lnSpc>
+                <a:buClr>
+                  <a:srgbClr val="00B050"/>
+                </a:buClr>
+                <a:buFont typeface="Wingdings" panose="05000000000000000000" pitchFamily="2" charset="2"/>
+                <a:buChar char="ü"/>
+              </a:pPr>
+              <a:r>
+                <a:rPr lang="fr-FR" sz="2000" dirty="0">
+                  <a:solidFill>
+                    <a:srgbClr val="251E20"/>
+                  </a:solidFill>
+                  <a:latin typeface="Roboto"/>
+                </a:rPr>
+                <a:t>Variables par itération : 3 à 28 (80%) par 1</a:t>
+              </a:r>
+            </a:p>
+            <a:p>
+              <a:pPr marL="1371600" lvl="2" indent="-457200">
+                <a:lnSpc>
+                  <a:spcPts val="3640"/>
+                </a:lnSpc>
+                <a:buClr>
+                  <a:srgbClr val="00B050"/>
+                </a:buClr>
+                <a:buFont typeface="Wingdings" panose="05000000000000000000" pitchFamily="2" charset="2"/>
+                <a:buChar char="ü"/>
+              </a:pPr>
+              <a:r>
+                <a:rPr lang="fr-FR" sz="2000" dirty="0">
+                  <a:solidFill>
+                    <a:srgbClr val="251E20"/>
+                  </a:solidFill>
+                  <a:latin typeface="Roboto"/>
+                </a:rPr>
+                <a:t>Fonction d’entropie : </a:t>
+              </a:r>
+              <a:r>
+                <a:rPr lang="fr-FR" sz="2000" dirty="0" err="1">
+                  <a:solidFill>
+                    <a:srgbClr val="251E20"/>
+                  </a:solidFill>
+                  <a:latin typeface="Roboto"/>
+                </a:rPr>
+                <a:t>gini</a:t>
+              </a:r>
+              <a:endParaRPr lang="fr-FR" sz="2000" dirty="0">
+                <a:solidFill>
+                  <a:srgbClr val="251E20"/>
+                </a:solidFill>
+                <a:latin typeface="Roboto"/>
+              </a:endParaRPr>
+            </a:p>
+            <a:p>
+              <a:pPr marL="1371600" lvl="2" indent="-457200">
+                <a:lnSpc>
+                  <a:spcPts val="3640"/>
+                </a:lnSpc>
+                <a:buClr>
+                  <a:srgbClr val="00B050"/>
+                </a:buClr>
+                <a:buFont typeface="Wingdings" panose="05000000000000000000" pitchFamily="2" charset="2"/>
+                <a:buChar char="ü"/>
+              </a:pPr>
+              <a:r>
+                <a:rPr lang="fr-FR" sz="2000" dirty="0">
+                  <a:solidFill>
+                    <a:srgbClr val="251E20"/>
+                  </a:solidFill>
+                  <a:latin typeface="Roboto"/>
+                </a:rPr>
+                <a:t>Nombre minimal </a:t>
+              </a:r>
+              <a:r>
+                <a:rPr lang="fr-FR" sz="2000" dirty="0" err="1">
+                  <a:solidFill>
+                    <a:srgbClr val="251E20"/>
+                  </a:solidFill>
+                  <a:latin typeface="Roboto"/>
+                </a:rPr>
+                <a:t>d’obs</a:t>
+              </a:r>
+              <a:r>
+                <a:rPr lang="fr-FR" sz="2000" dirty="0">
+                  <a:solidFill>
+                    <a:srgbClr val="251E20"/>
+                  </a:solidFill>
+                  <a:latin typeface="Roboto"/>
+                </a:rPr>
+                <a:t> par feuille : 1</a:t>
+              </a:r>
+            </a:p>
+          </p:txBody>
+        </p:sp>
+      </p:grpSp>
+      <p:grpSp>
+        <p:nvGrpSpPr>
+          <p:cNvPr id="24" name="Group 10">
+            <a:extLst>
+              <a:ext uri="{FF2B5EF4-FFF2-40B4-BE49-F238E27FC236}">
+                <a16:creationId xmlns:a16="http://schemas.microsoft.com/office/drawing/2014/main" id="{15CC6E7D-A530-46D0-A089-DB0E04CD3B3A}"/>
+              </a:ext>
+            </a:extLst>
+          </p:cNvPr>
+          <p:cNvGrpSpPr/>
+          <p:nvPr/>
+        </p:nvGrpSpPr>
+        <p:grpSpPr>
+          <a:xfrm>
+            <a:off x="5749368" y="6948950"/>
+            <a:ext cx="8104423" cy="1816389"/>
+            <a:chOff x="0" y="-76200"/>
+            <a:chExt cx="9125299" cy="2421852"/>
+          </a:xfrm>
+        </p:grpSpPr>
+        <p:sp>
+          <p:nvSpPr>
+            <p:cNvPr id="25" name="TextBox 11">
+              <a:extLst>
+                <a:ext uri="{FF2B5EF4-FFF2-40B4-BE49-F238E27FC236}">
+                  <a16:creationId xmlns:a16="http://schemas.microsoft.com/office/drawing/2014/main" id="{3790862F-7216-4112-B3F7-9317BB5E5157}"/>
+                </a:ext>
+              </a:extLst>
+            </p:cNvPr>
+            <p:cNvSpPr txBox="1"/>
+            <p:nvPr/>
+          </p:nvSpPr>
+          <p:spPr>
+            <a:xfrm>
+              <a:off x="0" y="-76200"/>
+              <a:ext cx="9125299" cy="666850"/>
+            </a:xfrm>
+            <a:prstGeom prst="rect">
+              <a:avLst/>
+            </a:prstGeom>
+          </p:spPr>
+          <p:txBody>
+            <a:bodyPr lIns="0" tIns="0" rIns="0" bIns="0" rtlCol="0" anchor="t">
+              <a:spAutoFit/>
+            </a:bodyPr>
+            <a:lstStyle/>
+            <a:p>
+              <a:pPr marL="704850" lvl="1" indent="-457200">
+                <a:lnSpc>
+                  <a:spcPts val="4200"/>
+                </a:lnSpc>
+                <a:buFont typeface="Arial"/>
+                <a:buChar char="•"/>
+              </a:pPr>
+              <a:r>
+                <a:rPr lang="fr-FR" sz="2400" spc="359" dirty="0" err="1">
+                  <a:solidFill>
+                    <a:srgbClr val="251E20"/>
+                  </a:solidFill>
+                  <a:latin typeface="Roboto"/>
+                </a:rPr>
+                <a:t>AdaBoosting</a:t>
+              </a:r>
+              <a:endParaRPr lang="fr-FR" sz="1400" dirty="0">
+                <a:cs typeface="Calibri"/>
+              </a:endParaRPr>
+            </a:p>
+          </p:txBody>
+        </p:sp>
+        <p:sp>
+          <p:nvSpPr>
+            <p:cNvPr id="26" name="TextBox 12">
+              <a:extLst>
+                <a:ext uri="{FF2B5EF4-FFF2-40B4-BE49-F238E27FC236}">
+                  <a16:creationId xmlns:a16="http://schemas.microsoft.com/office/drawing/2014/main" id="{00F57479-1E73-4430-9640-1E03CE7F5CCF}"/>
+                </a:ext>
+              </a:extLst>
+            </p:cNvPr>
+            <p:cNvSpPr txBox="1"/>
+            <p:nvPr/>
+          </p:nvSpPr>
+          <p:spPr>
+            <a:xfrm>
+              <a:off x="0" y="567388"/>
+              <a:ext cx="9125299" cy="1778264"/>
+            </a:xfrm>
+            <a:prstGeom prst="rect">
+              <a:avLst/>
+            </a:prstGeom>
+          </p:spPr>
+          <p:txBody>
+            <a:bodyPr lIns="0" tIns="0" rIns="0" bIns="0" rtlCol="0" anchor="t">
+              <a:spAutoFit/>
+            </a:bodyPr>
+            <a:lstStyle/>
+            <a:p>
+              <a:pPr marL="1371600" lvl="2" indent="-457200">
+                <a:lnSpc>
+                  <a:spcPts val="3640"/>
+                </a:lnSpc>
+                <a:buClr>
+                  <a:srgbClr val="00B050"/>
+                </a:buClr>
+                <a:buFont typeface="Wingdings" panose="05000000000000000000" pitchFamily="2" charset="2"/>
+                <a:buChar char="ü"/>
+              </a:pPr>
+              <a:r>
+                <a:rPr lang="fr-FR" sz="2000" dirty="0">
+                  <a:solidFill>
+                    <a:srgbClr val="251E20"/>
+                  </a:solidFill>
+                  <a:latin typeface="Roboto"/>
+                </a:rPr>
+                <a:t>Nombre d’itérations : 500</a:t>
+              </a:r>
+            </a:p>
+            <a:p>
+              <a:pPr marL="1371600" lvl="2" indent="-457200">
+                <a:lnSpc>
+                  <a:spcPts val="3640"/>
+                </a:lnSpc>
+                <a:buClr>
+                  <a:srgbClr val="00B050"/>
+                </a:buClr>
+                <a:buFont typeface="Wingdings" panose="05000000000000000000" pitchFamily="2" charset="2"/>
+                <a:buChar char="ü"/>
+              </a:pPr>
+              <a:r>
+                <a:rPr lang="fr-FR" sz="2000" dirty="0">
+                  <a:solidFill>
+                    <a:srgbClr val="251E20"/>
+                  </a:solidFill>
+                  <a:latin typeface="Roboto"/>
+                </a:rPr>
+                <a:t>Profondeur maximale : 5</a:t>
+              </a:r>
+            </a:p>
+            <a:p>
+              <a:pPr marL="1371600" lvl="2" indent="-457200">
+                <a:lnSpc>
+                  <a:spcPts val="3640"/>
+                </a:lnSpc>
+                <a:buClr>
+                  <a:srgbClr val="00B050"/>
+                </a:buClr>
+                <a:buFont typeface="Wingdings" panose="05000000000000000000" pitchFamily="2" charset="2"/>
+                <a:buChar char="ü"/>
+              </a:pPr>
+              <a:r>
+                <a:rPr lang="fr-FR" sz="2000" dirty="0">
+                  <a:solidFill>
+                    <a:srgbClr val="251E20"/>
+                  </a:solidFill>
+                  <a:latin typeface="Roboto"/>
+                </a:rPr>
+                <a:t>Taux d’apprentissage : 0.1</a:t>
+              </a:r>
+            </a:p>
+          </p:txBody>
+        </p:sp>
+      </p:grpSp>
+      <p:grpSp>
+        <p:nvGrpSpPr>
+          <p:cNvPr id="30" name="Group 10">
+            <a:extLst>
+              <a:ext uri="{FF2B5EF4-FFF2-40B4-BE49-F238E27FC236}">
+                <a16:creationId xmlns:a16="http://schemas.microsoft.com/office/drawing/2014/main" id="{3AB79DA2-9B31-44C1-88AE-DB93523E9AFF}"/>
+              </a:ext>
+            </a:extLst>
+          </p:cNvPr>
+          <p:cNvGrpSpPr/>
+          <p:nvPr/>
+        </p:nvGrpSpPr>
+        <p:grpSpPr>
+          <a:xfrm>
+            <a:off x="90809" y="3566533"/>
+            <a:ext cx="8104423" cy="1354725"/>
+            <a:chOff x="0" y="-76200"/>
+            <a:chExt cx="9125299" cy="1806300"/>
+          </a:xfrm>
+        </p:grpSpPr>
+        <p:sp>
+          <p:nvSpPr>
+            <p:cNvPr id="31" name="TextBox 11">
+              <a:extLst>
+                <a:ext uri="{FF2B5EF4-FFF2-40B4-BE49-F238E27FC236}">
+                  <a16:creationId xmlns:a16="http://schemas.microsoft.com/office/drawing/2014/main" id="{31470F01-CC29-4F6E-9E1F-41ED17841EF2}"/>
+                </a:ext>
+              </a:extLst>
+            </p:cNvPr>
+            <p:cNvSpPr txBox="1"/>
+            <p:nvPr/>
+          </p:nvSpPr>
+          <p:spPr>
+            <a:xfrm>
+              <a:off x="0" y="-76200"/>
+              <a:ext cx="9125299" cy="666850"/>
+            </a:xfrm>
+            <a:prstGeom prst="rect">
+              <a:avLst/>
+            </a:prstGeom>
+          </p:spPr>
+          <p:txBody>
+            <a:bodyPr lIns="0" tIns="0" rIns="0" bIns="0" rtlCol="0" anchor="t">
+              <a:spAutoFit/>
+            </a:bodyPr>
+            <a:lstStyle/>
+            <a:p>
+              <a:pPr marL="704850" lvl="1" indent="-457200">
+                <a:lnSpc>
+                  <a:spcPts val="4200"/>
+                </a:lnSpc>
+                <a:buFont typeface="Arial"/>
+                <a:buChar char="•"/>
+              </a:pPr>
+              <a:r>
+                <a:rPr lang="fr-FR" sz="2400" spc="359" dirty="0" err="1">
+                  <a:solidFill>
+                    <a:srgbClr val="251E20"/>
+                  </a:solidFill>
+                  <a:latin typeface="Roboto"/>
+                </a:rPr>
+                <a:t>Elastic</a:t>
+              </a:r>
+              <a:r>
+                <a:rPr lang="fr-FR" sz="2400" spc="359" dirty="0">
+                  <a:solidFill>
+                    <a:srgbClr val="251E20"/>
+                  </a:solidFill>
+                  <a:latin typeface="Roboto"/>
+                </a:rPr>
+                <a:t> Net</a:t>
+              </a:r>
+              <a:endParaRPr lang="fr-FR" sz="1400" dirty="0">
+                <a:cs typeface="Calibri"/>
+              </a:endParaRPr>
+            </a:p>
+          </p:txBody>
+        </p:sp>
+        <p:sp>
+          <p:nvSpPr>
+            <p:cNvPr id="32" name="TextBox 12">
+              <a:extLst>
+                <a:ext uri="{FF2B5EF4-FFF2-40B4-BE49-F238E27FC236}">
+                  <a16:creationId xmlns:a16="http://schemas.microsoft.com/office/drawing/2014/main" id="{16D83255-F87A-4056-BE7C-6ACEE1335E83}"/>
+                </a:ext>
+              </a:extLst>
+            </p:cNvPr>
+            <p:cNvSpPr txBox="1"/>
+            <p:nvPr/>
+          </p:nvSpPr>
+          <p:spPr>
+            <a:xfrm>
+              <a:off x="0" y="567388"/>
+              <a:ext cx="9125299" cy="1162712"/>
+            </a:xfrm>
+            <a:prstGeom prst="rect">
+              <a:avLst/>
+            </a:prstGeom>
+          </p:spPr>
+          <p:txBody>
+            <a:bodyPr lIns="0" tIns="0" rIns="0" bIns="0" rtlCol="0" anchor="t">
+              <a:spAutoFit/>
+            </a:bodyPr>
+            <a:lstStyle/>
+            <a:p>
+              <a:pPr marL="1371600" lvl="2" indent="-457200">
+                <a:lnSpc>
+                  <a:spcPts val="3640"/>
+                </a:lnSpc>
+                <a:buClr>
+                  <a:srgbClr val="00B050"/>
+                </a:buClr>
+                <a:buFont typeface="Wingdings" panose="05000000000000000000" pitchFamily="2" charset="2"/>
+                <a:buChar char="ü"/>
+              </a:pPr>
+              <a:r>
+                <a:rPr lang="fr-FR" sz="2000" dirty="0">
+                  <a:solidFill>
+                    <a:srgbClr val="251E20"/>
+                  </a:solidFill>
+                  <a:latin typeface="Roboto"/>
+                </a:rPr>
+                <a:t>Alpha (pénalisation) : 0 à 1 par 0.1</a:t>
+              </a:r>
+            </a:p>
+            <a:p>
+              <a:pPr marL="1371600" lvl="2" indent="-457200">
+                <a:lnSpc>
+                  <a:spcPts val="3640"/>
+                </a:lnSpc>
+                <a:buClr>
+                  <a:srgbClr val="00B050"/>
+                </a:buClr>
+                <a:buFont typeface="Wingdings" panose="05000000000000000000" pitchFamily="2" charset="2"/>
+                <a:buChar char="ü"/>
+              </a:pPr>
+              <a:r>
+                <a:rPr lang="fr-FR" sz="2000" dirty="0">
+                  <a:solidFill>
+                    <a:srgbClr val="251E20"/>
+                  </a:solidFill>
+                  <a:latin typeface="Roboto"/>
+                </a:rPr>
+                <a:t>Lambda (poids pénalisation) : 0 à 3 par 0.2</a:t>
+              </a:r>
+            </a:p>
+          </p:txBody>
+        </p:sp>
+      </p:grpSp>
+      <p:grpSp>
+        <p:nvGrpSpPr>
+          <p:cNvPr id="33" name="Group 10">
+            <a:extLst>
+              <a:ext uri="{FF2B5EF4-FFF2-40B4-BE49-F238E27FC236}">
+                <a16:creationId xmlns:a16="http://schemas.microsoft.com/office/drawing/2014/main" id="{6D9F4D11-7564-416C-AB55-2AF70F9FA2D4}"/>
+              </a:ext>
+            </a:extLst>
+          </p:cNvPr>
+          <p:cNvGrpSpPr/>
+          <p:nvPr/>
+        </p:nvGrpSpPr>
+        <p:grpSpPr>
+          <a:xfrm>
+            <a:off x="76200" y="5035673"/>
+            <a:ext cx="8104423" cy="893060"/>
+            <a:chOff x="0" y="-76200"/>
+            <a:chExt cx="9125299" cy="1190747"/>
+          </a:xfrm>
+        </p:grpSpPr>
+        <p:sp>
+          <p:nvSpPr>
+            <p:cNvPr id="34" name="TextBox 11">
+              <a:extLst>
+                <a:ext uri="{FF2B5EF4-FFF2-40B4-BE49-F238E27FC236}">
+                  <a16:creationId xmlns:a16="http://schemas.microsoft.com/office/drawing/2014/main" id="{E97387AC-0F29-4E4A-A8C1-416CD96E411E}"/>
+                </a:ext>
+              </a:extLst>
+            </p:cNvPr>
+            <p:cNvSpPr txBox="1"/>
+            <p:nvPr/>
+          </p:nvSpPr>
+          <p:spPr>
+            <a:xfrm>
+              <a:off x="0" y="-76200"/>
+              <a:ext cx="9125299" cy="666850"/>
+            </a:xfrm>
+            <a:prstGeom prst="rect">
+              <a:avLst/>
+            </a:prstGeom>
+          </p:spPr>
+          <p:txBody>
+            <a:bodyPr lIns="0" tIns="0" rIns="0" bIns="0" rtlCol="0" anchor="t">
+              <a:spAutoFit/>
+            </a:bodyPr>
+            <a:lstStyle/>
+            <a:p>
+              <a:pPr marL="704850" lvl="1" indent="-457200">
+                <a:lnSpc>
+                  <a:spcPts val="4200"/>
+                </a:lnSpc>
+                <a:buFont typeface="Arial"/>
+                <a:buChar char="•"/>
+              </a:pPr>
+              <a:r>
+                <a:rPr lang="fr-FR" sz="2400" spc="359" dirty="0">
+                  <a:solidFill>
+                    <a:srgbClr val="251E20"/>
+                  </a:solidFill>
+                  <a:latin typeface="Roboto"/>
+                </a:rPr>
+                <a:t>K plus proches voisins</a:t>
+              </a:r>
+              <a:endParaRPr lang="fr-FR" sz="1400" dirty="0">
+                <a:cs typeface="Calibri"/>
+              </a:endParaRPr>
+            </a:p>
+          </p:txBody>
+        </p:sp>
+        <p:sp>
+          <p:nvSpPr>
+            <p:cNvPr id="35" name="TextBox 12">
+              <a:extLst>
+                <a:ext uri="{FF2B5EF4-FFF2-40B4-BE49-F238E27FC236}">
+                  <a16:creationId xmlns:a16="http://schemas.microsoft.com/office/drawing/2014/main" id="{2A9CADA0-7D7B-45BF-A3C0-5CFD490D3E43}"/>
+                </a:ext>
+              </a:extLst>
+            </p:cNvPr>
+            <p:cNvSpPr txBox="1"/>
+            <p:nvPr/>
+          </p:nvSpPr>
+          <p:spPr>
+            <a:xfrm>
+              <a:off x="0" y="567388"/>
+              <a:ext cx="9125299" cy="547159"/>
+            </a:xfrm>
+            <a:prstGeom prst="rect">
+              <a:avLst/>
+            </a:prstGeom>
+          </p:spPr>
+          <p:txBody>
+            <a:bodyPr lIns="0" tIns="0" rIns="0" bIns="0" rtlCol="0" anchor="t">
+              <a:spAutoFit/>
+            </a:bodyPr>
+            <a:lstStyle/>
+            <a:p>
+              <a:pPr marL="1371600" lvl="2" indent="-457200">
+                <a:lnSpc>
+                  <a:spcPts val="3640"/>
+                </a:lnSpc>
+                <a:buClr>
+                  <a:srgbClr val="00B050"/>
+                </a:buClr>
+                <a:buFont typeface="Wingdings" panose="05000000000000000000" pitchFamily="2" charset="2"/>
+                <a:buChar char="ü"/>
+              </a:pPr>
+              <a:r>
+                <a:rPr lang="fr-FR" sz="2000" dirty="0">
+                  <a:solidFill>
+                    <a:srgbClr val="251E20"/>
+                  </a:solidFill>
+                  <a:latin typeface="Roboto"/>
+                </a:rPr>
+                <a:t>Nombre de voisins : 3</a:t>
+              </a:r>
+            </a:p>
+          </p:txBody>
+        </p:sp>
+      </p:grpSp>
+      <p:grpSp>
+        <p:nvGrpSpPr>
+          <p:cNvPr id="36" name="Group 10">
+            <a:extLst>
+              <a:ext uri="{FF2B5EF4-FFF2-40B4-BE49-F238E27FC236}">
+                <a16:creationId xmlns:a16="http://schemas.microsoft.com/office/drawing/2014/main" id="{8D1CCA94-CA59-4D00-A33A-4DC5CC14E641}"/>
+              </a:ext>
+            </a:extLst>
+          </p:cNvPr>
+          <p:cNvGrpSpPr/>
+          <p:nvPr/>
+        </p:nvGrpSpPr>
+        <p:grpSpPr>
+          <a:xfrm>
+            <a:off x="5749368" y="4587473"/>
+            <a:ext cx="8104423" cy="2278054"/>
+            <a:chOff x="0" y="-76200"/>
+            <a:chExt cx="9125299" cy="3037405"/>
+          </a:xfrm>
+        </p:grpSpPr>
+        <p:sp>
+          <p:nvSpPr>
+            <p:cNvPr id="37" name="TextBox 11">
+              <a:extLst>
+                <a:ext uri="{FF2B5EF4-FFF2-40B4-BE49-F238E27FC236}">
+                  <a16:creationId xmlns:a16="http://schemas.microsoft.com/office/drawing/2014/main" id="{06983216-DAE2-4BA1-BC92-002F291EBD01}"/>
+                </a:ext>
+              </a:extLst>
+            </p:cNvPr>
+            <p:cNvSpPr txBox="1"/>
+            <p:nvPr/>
+          </p:nvSpPr>
+          <p:spPr>
+            <a:xfrm>
+              <a:off x="0" y="-76200"/>
+              <a:ext cx="9125299" cy="666850"/>
+            </a:xfrm>
+            <a:prstGeom prst="rect">
+              <a:avLst/>
+            </a:prstGeom>
+          </p:spPr>
+          <p:txBody>
+            <a:bodyPr lIns="0" tIns="0" rIns="0" bIns="0" rtlCol="0" anchor="t">
+              <a:spAutoFit/>
+            </a:bodyPr>
+            <a:lstStyle/>
+            <a:p>
+              <a:pPr marL="704850" lvl="1" indent="-457200">
+                <a:lnSpc>
+                  <a:spcPts val="4200"/>
+                </a:lnSpc>
+                <a:buFont typeface="Arial"/>
+                <a:buChar char="•"/>
+              </a:pPr>
+              <a:r>
+                <a:rPr lang="fr-FR" sz="2400" spc="359" dirty="0">
+                  <a:solidFill>
+                    <a:srgbClr val="251E20"/>
+                  </a:solidFill>
+                  <a:latin typeface="Roboto"/>
+                </a:rPr>
+                <a:t>GBM</a:t>
+              </a:r>
+              <a:endParaRPr lang="fr-FR" sz="1400" dirty="0">
+                <a:cs typeface="Calibri"/>
+              </a:endParaRPr>
+            </a:p>
+          </p:txBody>
+        </p:sp>
+        <p:sp>
+          <p:nvSpPr>
+            <p:cNvPr id="38" name="TextBox 12">
+              <a:extLst>
+                <a:ext uri="{FF2B5EF4-FFF2-40B4-BE49-F238E27FC236}">
+                  <a16:creationId xmlns:a16="http://schemas.microsoft.com/office/drawing/2014/main" id="{01804FCF-D4F0-4621-92C4-A00365CD29B0}"/>
+                </a:ext>
+              </a:extLst>
+            </p:cNvPr>
+            <p:cNvSpPr txBox="1"/>
+            <p:nvPr/>
+          </p:nvSpPr>
+          <p:spPr>
+            <a:xfrm>
+              <a:off x="0" y="567388"/>
+              <a:ext cx="9125299" cy="2393817"/>
+            </a:xfrm>
+            <a:prstGeom prst="rect">
+              <a:avLst/>
+            </a:prstGeom>
+          </p:spPr>
+          <p:txBody>
+            <a:bodyPr lIns="0" tIns="0" rIns="0" bIns="0" rtlCol="0" anchor="t">
+              <a:spAutoFit/>
+            </a:bodyPr>
+            <a:lstStyle/>
+            <a:p>
+              <a:pPr marL="1371600" lvl="2" indent="-457200">
+                <a:lnSpc>
+                  <a:spcPts val="3640"/>
+                </a:lnSpc>
+                <a:buClr>
+                  <a:srgbClr val="00B050"/>
+                </a:buClr>
+                <a:buFont typeface="Wingdings" panose="05000000000000000000" pitchFamily="2" charset="2"/>
+                <a:buChar char="ü"/>
+              </a:pPr>
+              <a:r>
+                <a:rPr lang="fr-FR" sz="2000" dirty="0">
+                  <a:solidFill>
+                    <a:srgbClr val="251E20"/>
+                  </a:solidFill>
+                  <a:latin typeface="Roboto"/>
+                </a:rPr>
+                <a:t>Nombre d’arbres : 300 à 600 par 100</a:t>
+              </a:r>
+            </a:p>
+            <a:p>
+              <a:pPr marL="1371600" lvl="2" indent="-457200">
+                <a:lnSpc>
+                  <a:spcPts val="3640"/>
+                </a:lnSpc>
+                <a:buClr>
+                  <a:srgbClr val="00B050"/>
+                </a:buClr>
+                <a:buFont typeface="Wingdings" panose="05000000000000000000" pitchFamily="2" charset="2"/>
+                <a:buChar char="ü"/>
+              </a:pPr>
+              <a:r>
+                <a:rPr lang="fr-FR" sz="2000" dirty="0">
+                  <a:solidFill>
+                    <a:srgbClr val="251E20"/>
+                  </a:solidFill>
+                  <a:latin typeface="Roboto"/>
+                </a:rPr>
+                <a:t>Profondeur maximale : 1 à 6 par 1</a:t>
+              </a:r>
+            </a:p>
+            <a:p>
+              <a:pPr marL="1371600" lvl="2" indent="-457200">
+                <a:lnSpc>
+                  <a:spcPts val="3640"/>
+                </a:lnSpc>
+                <a:buClr>
+                  <a:srgbClr val="00B050"/>
+                </a:buClr>
+                <a:buFont typeface="Wingdings" panose="05000000000000000000" pitchFamily="2" charset="2"/>
+                <a:buChar char="ü"/>
+              </a:pPr>
+              <a:r>
+                <a:rPr lang="fr-FR" sz="2000" dirty="0">
+                  <a:solidFill>
+                    <a:srgbClr val="251E20"/>
+                  </a:solidFill>
+                  <a:latin typeface="Roboto"/>
+                </a:rPr>
+                <a:t>Taux d’apprentissage : 0.1</a:t>
+              </a:r>
+            </a:p>
+            <a:p>
+              <a:pPr marL="1371600" lvl="2" indent="-457200">
+                <a:lnSpc>
+                  <a:spcPts val="3640"/>
+                </a:lnSpc>
+                <a:buClr>
+                  <a:srgbClr val="00B050"/>
+                </a:buClr>
+                <a:buFont typeface="Wingdings" panose="05000000000000000000" pitchFamily="2" charset="2"/>
+                <a:buChar char="ü"/>
+              </a:pPr>
+              <a:r>
+                <a:rPr lang="fr-FR" sz="2000" dirty="0">
+                  <a:solidFill>
+                    <a:srgbClr val="251E20"/>
+                  </a:solidFill>
+                  <a:latin typeface="Roboto"/>
+                </a:rPr>
+                <a:t>Nombre min </a:t>
+              </a:r>
+              <a:r>
+                <a:rPr lang="fr-FR" sz="2000" dirty="0" err="1">
+                  <a:solidFill>
+                    <a:srgbClr val="251E20"/>
+                  </a:solidFill>
+                  <a:latin typeface="Roboto"/>
+                </a:rPr>
+                <a:t>d’obs</a:t>
+              </a:r>
+              <a:r>
+                <a:rPr lang="fr-FR" sz="2000" dirty="0">
+                  <a:solidFill>
+                    <a:srgbClr val="251E20"/>
+                  </a:solidFill>
+                  <a:latin typeface="Roboto"/>
+                </a:rPr>
+                <a:t> par feuille : 1</a:t>
+              </a:r>
+            </a:p>
+          </p:txBody>
+        </p:sp>
+      </p:grpSp>
+      <p:grpSp>
+        <p:nvGrpSpPr>
+          <p:cNvPr id="39" name="Group 10">
+            <a:extLst>
+              <a:ext uri="{FF2B5EF4-FFF2-40B4-BE49-F238E27FC236}">
+                <a16:creationId xmlns:a16="http://schemas.microsoft.com/office/drawing/2014/main" id="{F23FE0EE-4992-482D-9B79-FA9E48BE0BA2}"/>
+              </a:ext>
+            </a:extLst>
+          </p:cNvPr>
+          <p:cNvGrpSpPr/>
+          <p:nvPr/>
+        </p:nvGrpSpPr>
+        <p:grpSpPr>
+          <a:xfrm>
+            <a:off x="90809" y="6131224"/>
+            <a:ext cx="8104423" cy="1816389"/>
+            <a:chOff x="0" y="-76200"/>
+            <a:chExt cx="9125299" cy="2421852"/>
+          </a:xfrm>
+        </p:grpSpPr>
+        <p:sp>
+          <p:nvSpPr>
+            <p:cNvPr id="40" name="TextBox 11">
+              <a:extLst>
+                <a:ext uri="{FF2B5EF4-FFF2-40B4-BE49-F238E27FC236}">
+                  <a16:creationId xmlns:a16="http://schemas.microsoft.com/office/drawing/2014/main" id="{355C20B7-8DD4-4ADF-836B-A28767B86AD9}"/>
+                </a:ext>
+              </a:extLst>
+            </p:cNvPr>
+            <p:cNvSpPr txBox="1"/>
+            <p:nvPr/>
+          </p:nvSpPr>
+          <p:spPr>
+            <a:xfrm>
+              <a:off x="0" y="-76200"/>
+              <a:ext cx="9125299" cy="666850"/>
+            </a:xfrm>
+            <a:prstGeom prst="rect">
+              <a:avLst/>
+            </a:prstGeom>
+          </p:spPr>
+          <p:txBody>
+            <a:bodyPr lIns="0" tIns="0" rIns="0" bIns="0" rtlCol="0" anchor="t">
+              <a:spAutoFit/>
+            </a:bodyPr>
+            <a:lstStyle/>
+            <a:p>
+              <a:pPr marL="704850" lvl="1" indent="-457200">
+                <a:lnSpc>
+                  <a:spcPts val="4200"/>
+                </a:lnSpc>
+                <a:buFont typeface="Arial"/>
+                <a:buChar char="•"/>
+              </a:pPr>
+              <a:r>
+                <a:rPr lang="fr-FR" sz="2400" spc="359" dirty="0">
+                  <a:solidFill>
+                    <a:srgbClr val="251E20"/>
+                  </a:solidFill>
+                  <a:latin typeface="Roboto"/>
+                </a:rPr>
+                <a:t>SVM</a:t>
+              </a:r>
+              <a:endParaRPr lang="fr-FR" sz="1400" dirty="0">
+                <a:cs typeface="Calibri"/>
+              </a:endParaRPr>
+            </a:p>
+          </p:txBody>
+        </p:sp>
+        <p:sp>
+          <p:nvSpPr>
+            <p:cNvPr id="41" name="TextBox 12">
+              <a:extLst>
+                <a:ext uri="{FF2B5EF4-FFF2-40B4-BE49-F238E27FC236}">
+                  <a16:creationId xmlns:a16="http://schemas.microsoft.com/office/drawing/2014/main" id="{1EB3DB77-DB18-4977-A693-54865C4FA4F6}"/>
+                </a:ext>
+              </a:extLst>
+            </p:cNvPr>
+            <p:cNvSpPr txBox="1"/>
+            <p:nvPr/>
+          </p:nvSpPr>
+          <p:spPr>
+            <a:xfrm>
+              <a:off x="0" y="567388"/>
+              <a:ext cx="9125299" cy="1778264"/>
+            </a:xfrm>
+            <a:prstGeom prst="rect">
+              <a:avLst/>
+            </a:prstGeom>
+          </p:spPr>
+          <p:txBody>
+            <a:bodyPr lIns="0" tIns="0" rIns="0" bIns="0" rtlCol="0" anchor="t">
+              <a:spAutoFit/>
+            </a:bodyPr>
+            <a:lstStyle/>
+            <a:p>
+              <a:pPr marL="1371600" lvl="2" indent="-457200">
+                <a:lnSpc>
+                  <a:spcPts val="3640"/>
+                </a:lnSpc>
+                <a:buClr>
+                  <a:srgbClr val="00B050"/>
+                </a:buClr>
+                <a:buFont typeface="Wingdings" panose="05000000000000000000" pitchFamily="2" charset="2"/>
+                <a:buChar char="ü"/>
+              </a:pPr>
+              <a:r>
+                <a:rPr lang="fr-FR" sz="2000" dirty="0">
+                  <a:solidFill>
+                    <a:srgbClr val="251E20"/>
+                  </a:solidFill>
+                  <a:latin typeface="Roboto"/>
+                </a:rPr>
+                <a:t>Kernel : non linéaire (RBF)</a:t>
+              </a:r>
+            </a:p>
+            <a:p>
+              <a:pPr marL="1371600" lvl="2" indent="-457200">
+                <a:lnSpc>
+                  <a:spcPts val="3640"/>
+                </a:lnSpc>
+                <a:buClr>
+                  <a:srgbClr val="00B050"/>
+                </a:buClr>
+                <a:buFont typeface="Wingdings" panose="05000000000000000000" pitchFamily="2" charset="2"/>
+                <a:buChar char="ü"/>
+              </a:pPr>
+              <a:r>
+                <a:rPr lang="fr-FR" sz="2000" dirty="0">
+                  <a:solidFill>
+                    <a:srgbClr val="251E20"/>
+                  </a:solidFill>
+                  <a:latin typeface="Roboto"/>
+                </a:rPr>
+                <a:t>Sigma (noyau) : 1</a:t>
+              </a:r>
+            </a:p>
+            <a:p>
+              <a:pPr marL="1371600" lvl="2" indent="-457200">
+                <a:lnSpc>
+                  <a:spcPts val="3640"/>
+                </a:lnSpc>
+                <a:buClr>
+                  <a:srgbClr val="00B050"/>
+                </a:buClr>
+                <a:buFont typeface="Wingdings" panose="05000000000000000000" pitchFamily="2" charset="2"/>
+                <a:buChar char="ü"/>
+              </a:pPr>
+              <a:r>
+                <a:rPr lang="fr-FR" sz="2000" dirty="0">
+                  <a:solidFill>
+                    <a:srgbClr val="251E20"/>
+                  </a:solidFill>
+                  <a:latin typeface="Roboto"/>
+                </a:rPr>
+                <a:t>C (précision de la marge) : 1</a:t>
+              </a:r>
+            </a:p>
+          </p:txBody>
+        </p:sp>
+      </p:grpSp>
+      <p:grpSp>
+        <p:nvGrpSpPr>
+          <p:cNvPr id="42" name="Group 10">
+            <a:extLst>
+              <a:ext uri="{FF2B5EF4-FFF2-40B4-BE49-F238E27FC236}">
+                <a16:creationId xmlns:a16="http://schemas.microsoft.com/office/drawing/2014/main" id="{D4497E67-905A-44CF-86DD-630AFA6E34CE}"/>
+              </a:ext>
+            </a:extLst>
+          </p:cNvPr>
+          <p:cNvGrpSpPr/>
+          <p:nvPr/>
+        </p:nvGrpSpPr>
+        <p:grpSpPr>
+          <a:xfrm>
+            <a:off x="10945576" y="4811931"/>
+            <a:ext cx="8104423" cy="3663049"/>
+            <a:chOff x="0" y="-76200"/>
+            <a:chExt cx="9125299" cy="4884064"/>
+          </a:xfrm>
+        </p:grpSpPr>
+        <p:sp>
+          <p:nvSpPr>
+            <p:cNvPr id="43" name="TextBox 11">
+              <a:extLst>
+                <a:ext uri="{FF2B5EF4-FFF2-40B4-BE49-F238E27FC236}">
+                  <a16:creationId xmlns:a16="http://schemas.microsoft.com/office/drawing/2014/main" id="{D0ADD2AA-5232-4DF2-857C-CE337782D316}"/>
+                </a:ext>
+              </a:extLst>
+            </p:cNvPr>
+            <p:cNvSpPr txBox="1"/>
+            <p:nvPr/>
+          </p:nvSpPr>
+          <p:spPr>
+            <a:xfrm>
+              <a:off x="0" y="-76200"/>
+              <a:ext cx="9125299" cy="666850"/>
+            </a:xfrm>
+            <a:prstGeom prst="rect">
+              <a:avLst/>
+            </a:prstGeom>
+          </p:spPr>
+          <p:txBody>
+            <a:bodyPr lIns="0" tIns="0" rIns="0" bIns="0" rtlCol="0" anchor="t">
+              <a:spAutoFit/>
+            </a:bodyPr>
+            <a:lstStyle/>
+            <a:p>
+              <a:pPr marL="704850" lvl="1" indent="-457200">
+                <a:lnSpc>
+                  <a:spcPts val="4200"/>
+                </a:lnSpc>
+                <a:buFont typeface="Arial"/>
+                <a:buChar char="•"/>
+              </a:pPr>
+              <a:r>
+                <a:rPr lang="fr-FR" sz="2400" spc="359" dirty="0">
+                  <a:solidFill>
+                    <a:srgbClr val="251E20"/>
+                  </a:solidFill>
+                  <a:latin typeface="Roboto"/>
+                </a:rPr>
+                <a:t>XGB</a:t>
+              </a:r>
+              <a:endParaRPr lang="fr-FR" sz="1400" dirty="0">
+                <a:cs typeface="Calibri"/>
+              </a:endParaRPr>
+            </a:p>
+          </p:txBody>
+        </p:sp>
+        <p:sp>
+          <p:nvSpPr>
+            <p:cNvPr id="44" name="TextBox 12">
+              <a:extLst>
+                <a:ext uri="{FF2B5EF4-FFF2-40B4-BE49-F238E27FC236}">
+                  <a16:creationId xmlns:a16="http://schemas.microsoft.com/office/drawing/2014/main" id="{653DF5B7-D769-4B4F-AE13-9A2503565A4A}"/>
+                </a:ext>
+              </a:extLst>
+            </p:cNvPr>
+            <p:cNvSpPr txBox="1"/>
+            <p:nvPr/>
+          </p:nvSpPr>
+          <p:spPr>
+            <a:xfrm>
+              <a:off x="0" y="567388"/>
+              <a:ext cx="9125299" cy="4240476"/>
+            </a:xfrm>
+            <a:prstGeom prst="rect">
+              <a:avLst/>
+            </a:prstGeom>
+          </p:spPr>
+          <p:txBody>
+            <a:bodyPr lIns="0" tIns="0" rIns="0" bIns="0" rtlCol="0" anchor="t">
+              <a:spAutoFit/>
+            </a:bodyPr>
+            <a:lstStyle/>
+            <a:p>
+              <a:pPr marL="1371600" lvl="2" indent="-457200">
+                <a:lnSpc>
+                  <a:spcPts val="3640"/>
+                </a:lnSpc>
+                <a:buClr>
+                  <a:srgbClr val="00B050"/>
+                </a:buClr>
+                <a:buFont typeface="Wingdings" panose="05000000000000000000" pitchFamily="2" charset="2"/>
+                <a:buChar char="ü"/>
+              </a:pPr>
+              <a:r>
+                <a:rPr lang="fr-FR" sz="2000" dirty="0">
+                  <a:solidFill>
+                    <a:srgbClr val="251E20"/>
+                  </a:solidFill>
+                  <a:latin typeface="Roboto"/>
+                </a:rPr>
+                <a:t>Nombre d’itérations : 100 à 500 par 100</a:t>
+              </a:r>
+            </a:p>
+            <a:p>
+              <a:pPr marL="1371600" lvl="2" indent="-457200">
+                <a:lnSpc>
+                  <a:spcPts val="3640"/>
+                </a:lnSpc>
+                <a:buClr>
+                  <a:srgbClr val="00B050"/>
+                </a:buClr>
+                <a:buFont typeface="Wingdings" panose="05000000000000000000" pitchFamily="2" charset="2"/>
+                <a:buChar char="ü"/>
+              </a:pPr>
+              <a:r>
+                <a:rPr lang="fr-FR" sz="2000" dirty="0">
+                  <a:solidFill>
+                    <a:srgbClr val="251E20"/>
+                  </a:solidFill>
+                  <a:latin typeface="Roboto"/>
+                </a:rPr>
+                <a:t>Taux d’apprentissage : 0.05 ou 0.1</a:t>
+              </a:r>
+            </a:p>
+            <a:p>
+              <a:pPr marL="1371600" lvl="2" indent="-457200">
+                <a:lnSpc>
+                  <a:spcPts val="3640"/>
+                </a:lnSpc>
+                <a:buClr>
+                  <a:srgbClr val="00B050"/>
+                </a:buClr>
+                <a:buFont typeface="Wingdings" panose="05000000000000000000" pitchFamily="2" charset="2"/>
+                <a:buChar char="ü"/>
+              </a:pPr>
+              <a:r>
+                <a:rPr lang="fr-FR" sz="2000" dirty="0">
+                  <a:solidFill>
+                    <a:srgbClr val="251E20"/>
+                  </a:solidFill>
+                  <a:latin typeface="Roboto"/>
+                </a:rPr>
+                <a:t>Profondeur maximale : 4 à 6 par 1</a:t>
+              </a:r>
+            </a:p>
+            <a:p>
+              <a:pPr marL="1371600" lvl="2" indent="-457200">
+                <a:lnSpc>
+                  <a:spcPts val="3640"/>
+                </a:lnSpc>
+                <a:buClr>
+                  <a:srgbClr val="00B050"/>
+                </a:buClr>
+                <a:buFont typeface="Wingdings" panose="05000000000000000000" pitchFamily="2" charset="2"/>
+                <a:buChar char="ü"/>
+              </a:pPr>
+              <a:r>
+                <a:rPr lang="fr-FR" sz="2000" dirty="0">
+                  <a:solidFill>
+                    <a:srgbClr val="251E20"/>
+                  </a:solidFill>
+                  <a:latin typeface="Roboto"/>
+                </a:rPr>
+                <a:t>Gamma (seuil de gain minimal pour découpe) : 0</a:t>
+              </a:r>
+            </a:p>
+            <a:p>
+              <a:pPr marL="1371600" lvl="2" indent="-457200">
+                <a:lnSpc>
+                  <a:spcPts val="3640"/>
+                </a:lnSpc>
+                <a:buClr>
+                  <a:srgbClr val="00B050"/>
+                </a:buClr>
+                <a:buFont typeface="Wingdings" panose="05000000000000000000" pitchFamily="2" charset="2"/>
+                <a:buChar char="ü"/>
+              </a:pPr>
+              <a:r>
+                <a:rPr lang="fr-FR" sz="2000" dirty="0">
+                  <a:solidFill>
+                    <a:srgbClr val="251E20"/>
+                  </a:solidFill>
+                  <a:latin typeface="Roboto"/>
+                </a:rPr>
+                <a:t>Part de variables à utiliser par arbre : 0.7</a:t>
+              </a:r>
+            </a:p>
+            <a:p>
+              <a:pPr marL="1371600" lvl="2" indent="-457200">
+                <a:lnSpc>
+                  <a:spcPts val="3640"/>
+                </a:lnSpc>
+                <a:buClr>
+                  <a:srgbClr val="00B050"/>
+                </a:buClr>
+                <a:buFont typeface="Wingdings" panose="05000000000000000000" pitchFamily="2" charset="2"/>
+                <a:buChar char="ü"/>
+              </a:pPr>
+              <a:r>
+                <a:rPr lang="fr-FR" sz="2000" dirty="0">
+                  <a:solidFill>
+                    <a:srgbClr val="251E20"/>
+                  </a:solidFill>
+                  <a:latin typeface="Roboto"/>
+                </a:rPr>
+                <a:t>Poids minimal des feuilles enfant pour découpe : 0</a:t>
+              </a:r>
+            </a:p>
+            <a:p>
+              <a:pPr marL="1371600" lvl="2" indent="-457200">
+                <a:lnSpc>
+                  <a:spcPts val="3640"/>
+                </a:lnSpc>
+                <a:buClr>
+                  <a:srgbClr val="00B050"/>
+                </a:buClr>
+                <a:buFont typeface="Wingdings" panose="05000000000000000000" pitchFamily="2" charset="2"/>
+                <a:buChar char="ü"/>
+              </a:pPr>
+              <a:r>
+                <a:rPr lang="fr-FR" sz="2000" dirty="0">
+                  <a:solidFill>
+                    <a:srgbClr val="251E20"/>
+                  </a:solidFill>
+                  <a:latin typeface="Roboto"/>
+                </a:rPr>
+                <a:t>Part des observations par itération : 0.7</a:t>
+              </a:r>
+            </a:p>
+          </p:txBody>
+        </p:sp>
+      </p:grpSp>
+      <p:grpSp>
+        <p:nvGrpSpPr>
+          <p:cNvPr id="45" name="Group 10">
+            <a:extLst>
+              <a:ext uri="{FF2B5EF4-FFF2-40B4-BE49-F238E27FC236}">
+                <a16:creationId xmlns:a16="http://schemas.microsoft.com/office/drawing/2014/main" id="{8AB31D3C-AF0D-4583-840B-8AD1B387693B}"/>
+              </a:ext>
+            </a:extLst>
+          </p:cNvPr>
+          <p:cNvGrpSpPr/>
+          <p:nvPr/>
+        </p:nvGrpSpPr>
+        <p:grpSpPr>
+          <a:xfrm>
+            <a:off x="10945577" y="2476500"/>
+            <a:ext cx="8104423" cy="2278054"/>
+            <a:chOff x="0" y="-76200"/>
+            <a:chExt cx="9125299" cy="3037405"/>
+          </a:xfrm>
+        </p:grpSpPr>
+        <p:sp>
+          <p:nvSpPr>
+            <p:cNvPr id="46" name="TextBox 11">
+              <a:extLst>
+                <a:ext uri="{FF2B5EF4-FFF2-40B4-BE49-F238E27FC236}">
+                  <a16:creationId xmlns:a16="http://schemas.microsoft.com/office/drawing/2014/main" id="{4BC62BE0-333F-44C4-932D-840FDB05A801}"/>
+                </a:ext>
+              </a:extLst>
+            </p:cNvPr>
+            <p:cNvSpPr txBox="1"/>
+            <p:nvPr/>
+          </p:nvSpPr>
+          <p:spPr>
+            <a:xfrm>
+              <a:off x="0" y="-76200"/>
+              <a:ext cx="9125299" cy="666850"/>
+            </a:xfrm>
+            <a:prstGeom prst="rect">
+              <a:avLst/>
+            </a:prstGeom>
+          </p:spPr>
+          <p:txBody>
+            <a:bodyPr lIns="0" tIns="0" rIns="0" bIns="0" rtlCol="0" anchor="t">
+              <a:spAutoFit/>
+            </a:bodyPr>
+            <a:lstStyle/>
+            <a:p>
+              <a:pPr marL="704850" lvl="1" indent="-457200">
+                <a:lnSpc>
+                  <a:spcPts val="4200"/>
+                </a:lnSpc>
+                <a:buFont typeface="Arial"/>
+                <a:buChar char="•"/>
+              </a:pPr>
+              <a:r>
+                <a:rPr lang="fr-FR" sz="2400" spc="359" dirty="0">
+                  <a:solidFill>
+                    <a:srgbClr val="251E20"/>
+                  </a:solidFill>
+                  <a:latin typeface="Roboto"/>
+                </a:rPr>
+                <a:t>LGB</a:t>
+              </a:r>
+              <a:endParaRPr lang="fr-FR" sz="1400" dirty="0">
+                <a:cs typeface="Calibri"/>
+              </a:endParaRPr>
+            </a:p>
+          </p:txBody>
+        </p:sp>
+        <p:sp>
+          <p:nvSpPr>
+            <p:cNvPr id="47" name="TextBox 12">
+              <a:extLst>
+                <a:ext uri="{FF2B5EF4-FFF2-40B4-BE49-F238E27FC236}">
+                  <a16:creationId xmlns:a16="http://schemas.microsoft.com/office/drawing/2014/main" id="{9385B560-972D-4DE9-88E7-00AF7A58E36F}"/>
+                </a:ext>
+              </a:extLst>
+            </p:cNvPr>
+            <p:cNvSpPr txBox="1"/>
+            <p:nvPr/>
+          </p:nvSpPr>
+          <p:spPr>
+            <a:xfrm>
+              <a:off x="0" y="567388"/>
+              <a:ext cx="9125299" cy="2393817"/>
+            </a:xfrm>
+            <a:prstGeom prst="rect">
+              <a:avLst/>
+            </a:prstGeom>
+          </p:spPr>
+          <p:txBody>
+            <a:bodyPr lIns="0" tIns="0" rIns="0" bIns="0" rtlCol="0" anchor="t">
+              <a:spAutoFit/>
+            </a:bodyPr>
+            <a:lstStyle/>
+            <a:p>
+              <a:pPr marL="1371600" lvl="2" indent="-457200">
+                <a:lnSpc>
+                  <a:spcPts val="3640"/>
+                </a:lnSpc>
+                <a:buClr>
+                  <a:srgbClr val="00B050"/>
+                </a:buClr>
+                <a:buFont typeface="Wingdings" panose="05000000000000000000" pitchFamily="2" charset="2"/>
+                <a:buChar char="ü"/>
+              </a:pPr>
+              <a:r>
+                <a:rPr lang="fr-FR" sz="2000" dirty="0">
+                  <a:solidFill>
+                    <a:srgbClr val="251E20"/>
+                  </a:solidFill>
+                  <a:latin typeface="Roboto"/>
+                </a:rPr>
+                <a:t>Profondeur maximale : 5 à 15 par 5</a:t>
+              </a:r>
+            </a:p>
+            <a:p>
+              <a:pPr marL="1371600" lvl="2" indent="-457200">
+                <a:lnSpc>
+                  <a:spcPts val="3640"/>
+                </a:lnSpc>
+                <a:buClr>
+                  <a:srgbClr val="00B050"/>
+                </a:buClr>
+                <a:buFont typeface="Wingdings" panose="05000000000000000000" pitchFamily="2" charset="2"/>
+                <a:buChar char="ü"/>
+              </a:pPr>
+              <a:r>
+                <a:rPr lang="fr-FR" sz="2000" dirty="0">
+                  <a:solidFill>
+                    <a:srgbClr val="251E20"/>
+                  </a:solidFill>
+                  <a:latin typeface="Roboto"/>
+                </a:rPr>
+                <a:t>Nombre max de feuilles : 10 à 25 par 5</a:t>
+              </a:r>
+            </a:p>
+            <a:p>
+              <a:pPr marL="1371600" lvl="2" indent="-457200">
+                <a:lnSpc>
+                  <a:spcPts val="3640"/>
+                </a:lnSpc>
+                <a:buClr>
+                  <a:srgbClr val="00B050"/>
+                </a:buClr>
+                <a:buFont typeface="Wingdings" panose="05000000000000000000" pitchFamily="2" charset="2"/>
+                <a:buChar char="ü"/>
+              </a:pPr>
+              <a:r>
+                <a:rPr lang="fr-FR" sz="2000" dirty="0">
+                  <a:solidFill>
+                    <a:srgbClr val="251E20"/>
+                  </a:solidFill>
+                  <a:latin typeface="Roboto"/>
+                </a:rPr>
+                <a:t>Fraction de variables : 0.7 à 0.9 par 0.1</a:t>
+              </a:r>
+            </a:p>
+            <a:p>
+              <a:pPr marL="1371600" lvl="2" indent="-457200">
+                <a:lnSpc>
+                  <a:spcPts val="3640"/>
+                </a:lnSpc>
+                <a:buClr>
+                  <a:srgbClr val="00B050"/>
+                </a:buClr>
+                <a:buFont typeface="Wingdings" panose="05000000000000000000" pitchFamily="2" charset="2"/>
+                <a:buChar char="ü"/>
+              </a:pPr>
+              <a:r>
+                <a:rPr lang="fr-FR" sz="2000" dirty="0">
+                  <a:solidFill>
+                    <a:srgbClr val="251E20"/>
+                  </a:solidFill>
+                  <a:latin typeface="Roboto"/>
+                </a:rPr>
+                <a:t>Fraction d’observations : 0.6 à 0.8 par 0.1</a:t>
+              </a:r>
+            </a:p>
+          </p:txBody>
+        </p:sp>
+      </p:grpSp>
+    </p:spTree>
+    <p:extLst>
+      <p:ext uri="{BB962C8B-B14F-4D97-AF65-F5344CB8AC3E}">
+        <p14:creationId xmlns:p14="http://schemas.microsoft.com/office/powerpoint/2010/main" val="4219888295"/>
+      </p:ext>
+    </p:extLst>
+  </p:cSld>
+  <p:clrMapOvr>
+    <a:masterClrMapping/>
+  </p:clrMapOvr>
+</p:sld>
+</file>
+
 <file path=ppt/slides/slide2.xml><?xml version="1.0" encoding="utf-8"?>
 <p:sld xmlns:a="http://schemas.openxmlformats.org/drawingml/2006/main" xmlns:r="http://schemas.openxmlformats.org/officeDocument/2006/relationships" xmlns:p="http://schemas.openxmlformats.org/presentationml/2006/main">
   <p:cSld>
@@ -11114,7 +15234,7 @@
         </p:nvGrpSpPr>
         <p:grpSpPr>
           <a:xfrm>
-            <a:off x="1028699" y="3444459"/>
+            <a:off x="1028699" y="5905500"/>
             <a:ext cx="14093315" cy="2569011"/>
             <a:chOff x="0" y="-76200"/>
             <a:chExt cx="9125299" cy="3425349"/>
@@ -11149,7 +15269,7 @@
                 <a:buChar char="•"/>
               </a:pPr>
               <a:r>
-                <a:rPr lang="fr-FR" sz="3000" spc="359">
+                <a:rPr lang="fr-FR" sz="3000" spc="359" dirty="0">
                   <a:solidFill>
                     <a:srgbClr val="251E20"/>
                   </a:solidFill>
@@ -11379,7 +15499,7 @@
         </p:nvGrpSpPr>
         <p:grpSpPr>
           <a:xfrm>
-            <a:off x="1028700" y="6765017"/>
+            <a:off x="1028700" y="3238500"/>
             <a:ext cx="14368256" cy="2107346"/>
             <a:chOff x="0" y="-76200"/>
             <a:chExt cx="9125299" cy="2809796"/>
@@ -24831,8 +28951,11 @@
                 <a:lnSpc>
                   <a:spcPts val="3640"/>
                 </a:lnSpc>
-                <a:buFont typeface="Arial" panose="020B0604020202020204" pitchFamily="34" charset="0"/>
-                <a:buChar char="•"/>
+                <a:buClr>
+                  <a:srgbClr val="00B050"/>
+                </a:buClr>
+                <a:buFont typeface="Wingdings" panose="05000000000000000000" pitchFamily="2" charset="2"/>
+                <a:buChar char="ü"/>
               </a:pPr>
               <a:r>
                 <a:rPr lang="fr-FR" sz="2600" dirty="0">
@@ -24856,8 +28979,11 @@
                 <a:lnSpc>
                   <a:spcPts val="3640"/>
                 </a:lnSpc>
-                <a:buFont typeface="Arial" panose="020B0604020202020204" pitchFamily="34" charset="0"/>
-                <a:buChar char="•"/>
+                <a:buClr>
+                  <a:srgbClr val="00B050"/>
+                </a:buClr>
+                <a:buFont typeface="Wingdings" panose="05000000000000000000" pitchFamily="2" charset="2"/>
+                <a:buChar char="ü"/>
               </a:pPr>
               <a:r>
                 <a:rPr lang="fr-FR" sz="2600" dirty="0">
@@ -24881,8 +29007,11 @@
                 <a:lnSpc>
                   <a:spcPts val="3640"/>
                 </a:lnSpc>
-                <a:buFont typeface="Arial" panose="020B0604020202020204" pitchFamily="34" charset="0"/>
-                <a:buChar char="•"/>
+                <a:buClr>
+                  <a:srgbClr val="00B050"/>
+                </a:buClr>
+                <a:buFont typeface="Wingdings" panose="05000000000000000000" pitchFamily="2" charset="2"/>
+                <a:buChar char="ü"/>
               </a:pPr>
               <a:r>
                 <a:rPr lang="fr-FR" sz="2600" dirty="0">
@@ -24900,8 +29029,11 @@
                 <a:lnSpc>
                   <a:spcPts val="3640"/>
                 </a:lnSpc>
-                <a:buFont typeface="Arial" panose="020B0604020202020204" pitchFamily="34" charset="0"/>
-                <a:buChar char="•"/>
+                <a:buClr>
+                  <a:srgbClr val="00B050"/>
+                </a:buClr>
+                <a:buFont typeface="Wingdings" panose="05000000000000000000" pitchFamily="2" charset="2"/>
+                <a:buChar char="ü"/>
               </a:pPr>
               <a:r>
                 <a:rPr lang="fr-FR" sz="2600" dirty="0">
@@ -25071,8 +29203,12 @@
                 <a:lnSpc>
                   <a:spcPts val="3640"/>
                 </a:lnSpc>
-                <a:buFont typeface="Arial" panose="020B0604020202020204" pitchFamily="34" charset="0"/>
-                <a:buChar char="•"/>
+                <a:buClr>
+                  <a:srgbClr val="FF0000"/>
+                </a:buClr>
+                <a:buSzPct val="125000"/>
+                <a:buFont typeface="Roboto" panose="02010600030101010101" charset="0"/>
+                <a:buChar char="×"/>
               </a:pPr>
               <a:r>
                 <a:rPr lang="fr-FR" sz="2600" dirty="0">
@@ -25096,8 +29232,12 @@
                 <a:lnSpc>
                   <a:spcPts val="3640"/>
                 </a:lnSpc>
-                <a:buFont typeface="Arial" panose="020B0604020202020204" pitchFamily="34" charset="0"/>
-                <a:buChar char="•"/>
+                <a:buClr>
+                  <a:srgbClr val="FF0000"/>
+                </a:buClr>
+                <a:buSzPct val="125000"/>
+                <a:buFont typeface="Roboto" panose="02010600030101010101" charset="0"/>
+                <a:buChar char="×"/>
               </a:pPr>
               <a:r>
                 <a:rPr lang="fr-FR" sz="2600" dirty="0">
@@ -25115,8 +29255,12 @@
                 <a:lnSpc>
                   <a:spcPts val="3640"/>
                 </a:lnSpc>
-                <a:buFont typeface="Arial" panose="020B0604020202020204" pitchFamily="34" charset="0"/>
-                <a:buChar char="•"/>
+                <a:buClr>
+                  <a:srgbClr val="FF0000"/>
+                </a:buClr>
+                <a:buSzPct val="125000"/>
+                <a:buFont typeface="Roboto" panose="02010600030101010101" charset="0"/>
+                <a:buChar char="×"/>
               </a:pPr>
               <a:r>
                 <a:rPr lang="fr-FR" sz="2600" dirty="0">
@@ -25435,9 +29579,9 @@
         <p:grpSpPr>
           <a:xfrm>
             <a:off x="1042471" y="4686300"/>
-            <a:ext cx="14368256" cy="2611948"/>
+            <a:ext cx="14368256" cy="2150283"/>
             <a:chOff x="0" y="-133449"/>
-            <a:chExt cx="9125299" cy="3482598"/>
+            <a:chExt cx="9125299" cy="2867044"/>
           </a:xfrm>
         </p:grpSpPr>
         <p:sp>
@@ -25489,7 +29633,7 @@
           <p:spPr>
             <a:xfrm>
               <a:off x="0" y="929683"/>
-              <a:ext cx="9125299" cy="2419466"/>
+              <a:ext cx="9125299" cy="1803912"/>
             </a:xfrm>
             <a:prstGeom prst="rect">
               <a:avLst/>
@@ -25505,55 +29649,11 @@
                 <a:lnSpc>
                   <a:spcPts val="3640"/>
                 </a:lnSpc>
-                <a:buFont typeface="Arial" panose="020B0604020202020204" pitchFamily="34" charset="0"/>
-                <a:buChar char="•"/>
-              </a:pPr>
-              <a:r>
-                <a:rPr lang="fr-FR" sz="2600" dirty="0">
-                  <a:ea typeface="+mn-lt"/>
-                  <a:cs typeface="+mn-lt"/>
-                </a:rPr>
-                <a:t>Très efficace</a:t>
-              </a:r>
-              <a:endParaRPr lang="fr-FR" sz="2600" dirty="0">
-                <a:solidFill>
-                  <a:srgbClr val="251E20"/>
-                </a:solidFill>
-                <a:latin typeface="Roboto"/>
-                <a:ea typeface="Roboto"/>
-              </a:endParaRPr>
-            </a:p>
-            <a:p>
-              <a:pPr marL="1371600" lvl="2" indent="-457200">
-                <a:lnSpc>
-                  <a:spcPts val="3640"/>
-                </a:lnSpc>
-                <a:buFont typeface="Arial" panose="020B0604020202020204" pitchFamily="34" charset="0"/>
-                <a:buChar char="•"/>
-              </a:pPr>
-              <a:r>
-                <a:rPr lang="fr-FR" sz="2600" dirty="0">
-                  <a:ea typeface="+mn-lt"/>
-                  <a:cs typeface="+mn-lt"/>
-                </a:rPr>
-                <a:t>Gère automatiquement les phénomènes non-linéaires</a:t>
-              </a:r>
-              <a:endParaRPr lang="fr-FR" sz="2600" dirty="0">
-                <a:solidFill>
-                  <a:srgbClr val="000000"/>
-                </a:solidFill>
-                <a:latin typeface="Calibri"/>
-                <a:ea typeface="Roboto"/>
-                <a:cs typeface="Calibri"/>
-              </a:endParaRPr>
-            </a:p>
-            <a:p>
-              <a:pPr marL="1371600" lvl="2" indent="-457200">
-                <a:lnSpc>
-                  <a:spcPts val="3640"/>
-                </a:lnSpc>
-                <a:buFont typeface="Arial" panose="020B0604020202020204" pitchFamily="34" charset="0"/>
-                <a:buChar char="•"/>
+                <a:buClr>
+                  <a:srgbClr val="00B050"/>
+                </a:buClr>
+                <a:buFont typeface="Wingdings" panose="05000000000000000000" pitchFamily="2" charset="2"/>
+                <a:buChar char="ü"/>
               </a:pPr>
               <a:r>
                 <a:rPr lang="fr-FR" sz="2600" dirty="0">
@@ -25561,9 +29661,8 @@
                     <a:srgbClr val="251E20"/>
                   </a:solidFill>
                   <a:latin typeface="Roboto"/>
-                  <a:ea typeface="Roboto"/>
                 </a:rPr>
-                <a:t>Très customisable car un grand nombre de paramètres</a:t>
+                <a:t>Très efficace</a:t>
               </a:r>
             </a:p>
             <a:p>
@@ -25571,8 +29670,11 @@
                 <a:lnSpc>
                   <a:spcPts val="3640"/>
                 </a:lnSpc>
-                <a:buFont typeface="Arial" panose="020B0604020202020204" pitchFamily="34" charset="0"/>
-                <a:buChar char="•"/>
+                <a:buClr>
+                  <a:srgbClr val="00B050"/>
+                </a:buClr>
+                <a:buFont typeface="Wingdings" panose="05000000000000000000" pitchFamily="2" charset="2"/>
+                <a:buChar char="ü"/>
               </a:pPr>
               <a:r>
                 <a:rPr lang="fr-FR" sz="2600" dirty="0">
@@ -25580,9 +29682,29 @@
                     <a:srgbClr val="251E20"/>
                   </a:solidFill>
                   <a:latin typeface="Roboto"/>
-                  <a:ea typeface="Roboto"/>
                 </a:rPr>
-                <a:t>Mécanisme de sélection de variable possible</a:t>
+                <a:t>Gère automatiquement les phénomènes non-linéaires</a:t>
+              </a:r>
+            </a:p>
+            <a:p>
+              <a:pPr marL="1371600" lvl="2" indent="-457200">
+                <a:lnSpc>
+                  <a:spcPts val="3640"/>
+                </a:lnSpc>
+                <a:buClr>
+                  <a:srgbClr val="00B050"/>
+                </a:buClr>
+                <a:buFont typeface="Wingdings" panose="05000000000000000000" pitchFamily="2" charset="2"/>
+                <a:buChar char="ü"/>
+              </a:pPr>
+              <a:r>
+                <a:rPr lang="fr-FR" sz="2600" dirty="0">
+                  <a:solidFill>
+                    <a:srgbClr val="251E20"/>
+                  </a:solidFill>
+                  <a:latin typeface="Roboto"/>
+                </a:rPr>
+                <a:t>Très customisable car un grand nombre de paramètres</a:t>
               </a:r>
             </a:p>
           </p:txBody>
@@ -25711,7 +29833,7 @@
         </p:nvGrpSpPr>
         <p:grpSpPr>
           <a:xfrm>
-            <a:off x="1042471" y="7505700"/>
+            <a:off x="1042471" y="7099759"/>
             <a:ext cx="14368256" cy="2496669"/>
             <a:chOff x="0" y="-76200"/>
             <a:chExt cx="9125299" cy="3328894"/>
@@ -25794,8 +29916,12 @@
                 <a:lnSpc>
                   <a:spcPts val="3640"/>
                 </a:lnSpc>
-                <a:buFont typeface="Arial"/>
-                <a:buChar char="•"/>
+                <a:buClr>
+                  <a:srgbClr val="FF0000"/>
+                </a:buClr>
+                <a:buSzPct val="125000"/>
+                <a:buFont typeface="Roboto" panose="02010600030101010101" charset="0"/>
+                <a:buChar char="×"/>
               </a:pPr>
               <a:r>
                 <a:rPr lang="fr-FR" sz="2600" dirty="0">
@@ -25819,8 +29945,12 @@
                 <a:lnSpc>
                   <a:spcPts val="3640"/>
                 </a:lnSpc>
-                <a:buFont typeface="Arial" panose="020B0604020202020204" pitchFamily="34" charset="0"/>
-                <a:buChar char="•"/>
+                <a:buClr>
+                  <a:srgbClr val="FF0000"/>
+                </a:buClr>
+                <a:buSzPct val="125000"/>
+                <a:buFont typeface="Roboto" panose="02010600030101010101" charset="0"/>
+                <a:buChar char="×"/>
               </a:pPr>
               <a:r>
                 <a:rPr lang="fr-FR" sz="2600" dirty="0">
@@ -25855,8 +29985,12 @@
                 <a:lnSpc>
                   <a:spcPts val="3640"/>
                 </a:lnSpc>
-                <a:buFont typeface="Arial" panose="020B0604020202020204" pitchFamily="34" charset="0"/>
-                <a:buChar char="•"/>
+                <a:buClr>
+                  <a:srgbClr val="FF0000"/>
+                </a:buClr>
+                <a:buSzPct val="125000"/>
+                <a:buFont typeface="Roboto" panose="02010600030101010101" charset="0"/>
+                <a:buChar char="×"/>
               </a:pPr>
               <a:r>
                 <a:rPr lang="fr-FR" sz="2600" dirty="0">
@@ -25874,8 +30008,12 @@
                 <a:lnSpc>
                   <a:spcPts val="3640"/>
                 </a:lnSpc>
-                <a:buFont typeface="Arial" panose="020B0604020202020204" pitchFamily="34" charset="0"/>
-                <a:buChar char="•"/>
+                <a:buClr>
+                  <a:srgbClr val="FF0000"/>
+                </a:buClr>
+                <a:buSzPct val="125000"/>
+                <a:buFont typeface="Roboto" panose="02010600030101010101" charset="0"/>
+                <a:buChar char="×"/>
               </a:pPr>
               <a:r>
                 <a:rPr lang="fr-FR" sz="2600" dirty="0">

</xml_diff>